<commit_message>
doc: update json schema
</commit_message>
<xml_diff>
--- a/docs/package_development/plugins/json/DeviveJsonStruct.pptx
+++ b/docs/package_development/plugins/json/DeviveJsonStruct.pptx
@@ -192,7 +192,7 @@
           <a:p>
             <a:fld id="{F480429E-02E0-4674-94D5-A6AB750D982F}" type="datetimeFigureOut">
               <a:rPr lang="fr-FR" smtClean="0"/>
-              <a:t>02/10/2013</a:t>
+              <a:t>14/01/2014</a:t>
             </a:fld>
             <a:endParaRPr lang="fr-FR"/>
           </a:p>
@@ -725,7 +725,7 @@
           <a:p>
             <a:fld id="{8BFE2DE5-261B-46F9-A238-E9807AC32907}" type="datetimeFigureOut">
               <a:rPr lang="fr-FR" smtClean="0"/>
-              <a:t>01/10/2013</a:t>
+              <a:t>14/01/2014</a:t>
             </a:fld>
             <a:endParaRPr lang="fr-FR" dirty="0"/>
           </a:p>
@@ -895,7 +895,7 @@
           <a:p>
             <a:fld id="{8BFE2DE5-261B-46F9-A238-E9807AC32907}" type="datetimeFigureOut">
               <a:rPr lang="fr-FR" smtClean="0"/>
-              <a:t>01/10/2013</a:t>
+              <a:t>14/01/2014</a:t>
             </a:fld>
             <a:endParaRPr lang="fr-FR" dirty="0"/>
           </a:p>
@@ -1075,7 +1075,7 @@
           <a:p>
             <a:fld id="{8BFE2DE5-261B-46F9-A238-E9807AC32907}" type="datetimeFigureOut">
               <a:rPr lang="fr-FR" smtClean="0"/>
-              <a:t>01/10/2013</a:t>
+              <a:t>14/01/2014</a:t>
             </a:fld>
             <a:endParaRPr lang="fr-FR" dirty="0"/>
           </a:p>
@@ -1245,7 +1245,7 @@
           <a:p>
             <a:fld id="{8BFE2DE5-261B-46F9-A238-E9807AC32907}" type="datetimeFigureOut">
               <a:rPr lang="fr-FR" smtClean="0"/>
-              <a:t>01/10/2013</a:t>
+              <a:t>14/01/2014</a:t>
             </a:fld>
             <a:endParaRPr lang="fr-FR" dirty="0"/>
           </a:p>
@@ -1491,7 +1491,7 @@
           <a:p>
             <a:fld id="{8BFE2DE5-261B-46F9-A238-E9807AC32907}" type="datetimeFigureOut">
               <a:rPr lang="fr-FR" smtClean="0"/>
-              <a:t>01/10/2013</a:t>
+              <a:t>14/01/2014</a:t>
             </a:fld>
             <a:endParaRPr lang="fr-FR" dirty="0"/>
           </a:p>
@@ -1779,7 +1779,7 @@
           <a:p>
             <a:fld id="{8BFE2DE5-261B-46F9-A238-E9807AC32907}" type="datetimeFigureOut">
               <a:rPr lang="fr-FR" smtClean="0"/>
-              <a:t>01/10/2013</a:t>
+              <a:t>14/01/2014</a:t>
             </a:fld>
             <a:endParaRPr lang="fr-FR" dirty="0"/>
           </a:p>
@@ -2201,7 +2201,7 @@
           <a:p>
             <a:fld id="{8BFE2DE5-261B-46F9-A238-E9807AC32907}" type="datetimeFigureOut">
               <a:rPr lang="fr-FR" smtClean="0"/>
-              <a:t>01/10/2013</a:t>
+              <a:t>14/01/2014</a:t>
             </a:fld>
             <a:endParaRPr lang="fr-FR" dirty="0"/>
           </a:p>
@@ -2319,7 +2319,7 @@
           <a:p>
             <a:fld id="{8BFE2DE5-261B-46F9-A238-E9807AC32907}" type="datetimeFigureOut">
               <a:rPr lang="fr-FR" smtClean="0"/>
-              <a:t>01/10/2013</a:t>
+              <a:t>14/01/2014</a:t>
             </a:fld>
             <a:endParaRPr lang="fr-FR" dirty="0"/>
           </a:p>
@@ -2414,7 +2414,7 @@
           <a:p>
             <a:fld id="{8BFE2DE5-261B-46F9-A238-E9807AC32907}" type="datetimeFigureOut">
               <a:rPr lang="fr-FR" smtClean="0"/>
-              <a:t>01/10/2013</a:t>
+              <a:t>14/01/2014</a:t>
             </a:fld>
             <a:endParaRPr lang="fr-FR" dirty="0"/>
           </a:p>
@@ -2691,7 +2691,7 @@
           <a:p>
             <a:fld id="{8BFE2DE5-261B-46F9-A238-E9807AC32907}" type="datetimeFigureOut">
               <a:rPr lang="fr-FR" smtClean="0"/>
-              <a:t>01/10/2013</a:t>
+              <a:t>14/01/2014</a:t>
             </a:fld>
             <a:endParaRPr lang="fr-FR" dirty="0"/>
           </a:p>
@@ -2944,7 +2944,7 @@
           <a:p>
             <a:fld id="{8BFE2DE5-261B-46F9-A238-E9807AC32907}" type="datetimeFigureOut">
               <a:rPr lang="fr-FR" smtClean="0"/>
-              <a:t>01/10/2013</a:t>
+              <a:t>14/01/2014</a:t>
             </a:fld>
             <a:endParaRPr lang="fr-FR" dirty="0"/>
           </a:p>
@@ -3157,7 +3157,7 @@
           <a:p>
             <a:fld id="{8BFE2DE5-261B-46F9-A238-E9807AC32907}" type="datetimeFigureOut">
               <a:rPr lang="fr-FR" smtClean="0"/>
-              <a:t>01/10/2013</a:t>
+              <a:t>14/01/2014</a:t>
             </a:fld>
             <a:endParaRPr lang="fr-FR" dirty="0"/>
           </a:p>
@@ -4222,11 +4222,6 @@
                 </a:rPr>
                 <a:t>’ </a:t>
               </a:r>
-              <a:endParaRPr lang="fr-FR" sz="2000" dirty="0">
-                <a:solidFill>
-                  <a:schemeClr val="bg1"/>
-                </a:solidFill>
-              </a:endParaRPr>
             </a:p>
           </p:txBody>
         </p:sp>
@@ -4753,14 +4748,6 @@
                 </a:rPr>
                 <a:t> value</a:t>
               </a:r>
-              <a:endParaRPr lang="fr-FR" sz="2000" dirty="0">
-                <a:solidFill>
-                  <a:schemeClr val="tx1">
-                    <a:lumMod val="85000"/>
-                    <a:lumOff val="15000"/>
-                  </a:schemeClr>
-                </a:solidFill>
-              </a:endParaRPr>
             </a:p>
           </p:txBody>
         </p:sp>
@@ -5254,11 +5241,6 @@
                 </a:rPr>
                 <a:t>	</a:t>
               </a:r>
-              <a:endParaRPr lang="fr-FR" sz="2000" dirty="0">
-                <a:solidFill>
-                  <a:schemeClr val="bg1"/>
-                </a:solidFill>
-              </a:endParaRPr>
             </a:p>
           </p:txBody>
         </p:sp>
@@ -5354,10 +5336,10 @@
         </p:nvGrpSpPr>
         <p:grpSpPr>
           <a:xfrm>
-            <a:off x="72158" y="5616267"/>
-            <a:ext cx="5031761" cy="5996925"/>
+            <a:off x="93222" y="4356596"/>
+            <a:ext cx="5031761" cy="6419421"/>
             <a:chOff x="353110" y="191586"/>
-            <a:chExt cx="2252063" cy="2538381"/>
+            <a:chExt cx="2252063" cy="2717215"/>
           </a:xfrm>
         </p:grpSpPr>
         <p:sp>
@@ -5369,7 +5351,7 @@
           <p:spPr>
             <a:xfrm>
               <a:off x="353112" y="408080"/>
-              <a:ext cx="2252061" cy="2321887"/>
+              <a:ext cx="2252061" cy="2500721"/>
             </a:xfrm>
             <a:prstGeom prst="rect">
               <a:avLst/>
@@ -5742,9 +5724,93 @@
                 <a:buChar char="-"/>
               </a:pPr>
               <a:r>
-                <a:rPr lang="fr-FR" sz="2300" dirty="0"/>
+                <a:rPr lang="fr-FR" sz="2300" dirty="0" err="1" smtClean="0"/>
+                <a:t>xpl</a:t>
+              </a:r>
+              <a:r>
+                <a:rPr lang="fr-FR" sz="2300" dirty="0" smtClean="0"/>
+                <a:t> : </a:t>
+              </a:r>
+              <a:r>
+                <a:rPr lang="fr-FR" sz="2300" dirty="0">
+                  <a:solidFill>
+                    <a:srgbClr val="7030A0"/>
+                  </a:solidFill>
+                </a:rPr>
+                <a:t>‘</a:t>
+              </a:r>
+              <a:r>
+                <a:rPr lang="fr-FR" sz="2300" dirty="0" err="1">
+                  <a:solidFill>
+                    <a:srgbClr val="7030A0"/>
+                  </a:solidFill>
+                </a:rPr>
+                <a:t>true</a:t>
+              </a:r>
+              <a:r>
+                <a:rPr lang="fr-FR" sz="2300" dirty="0">
+                  <a:solidFill>
+                    <a:srgbClr val="7030A0"/>
+                  </a:solidFill>
+                </a:rPr>
+                <a:t>, false’ </a:t>
+              </a:r>
+              <a:r>
+                <a:rPr lang="fr-FR" sz="2000" dirty="0">
+                  <a:solidFill>
+                    <a:schemeClr val="tx1"/>
+                  </a:solidFill>
+                </a:rPr>
+                <a:t>‘</a:t>
+              </a:r>
+              <a:r>
+                <a:rPr lang="en-US" sz="2000" dirty="0">
+                  <a:solidFill>
+                    <a:schemeClr val="tx1"/>
+                  </a:solidFill>
+                </a:rPr>
+                <a:t>must be true for </a:t>
+              </a:r>
+              <a:r>
+                <a:rPr lang="en-US" sz="2000" dirty="0" smtClean="0">
+                  <a:solidFill>
+                    <a:schemeClr val="tx1"/>
+                  </a:solidFill>
+                </a:rPr>
+                <a:t>reported into  </a:t>
+              </a:r>
+              <a:r>
+                <a:rPr lang="en-US" sz="2000" dirty="0" err="1">
+                  <a:solidFill>
+                    <a:schemeClr val="tx1"/>
+                  </a:solidFill>
+                </a:rPr>
+                <a:t>xpl</a:t>
+              </a:r>
+              <a:r>
+                <a:rPr lang="en-US" sz="2000" dirty="0">
+                  <a:solidFill>
+                    <a:schemeClr val="tx1"/>
+                  </a:solidFill>
+                </a:rPr>
+                <a:t> message’ </a:t>
+              </a:r>
+              <a:endParaRPr lang="en-US" sz="2000" dirty="0" smtClean="0">
+                <a:solidFill>
+                  <a:schemeClr val="tx1"/>
+                </a:solidFill>
+              </a:endParaRPr>
+            </a:p>
+            <a:p>
+              <a:pPr marL="494828" lvl="1" indent="-179670">
+                <a:buFontTx/>
+                <a:buChar char="-"/>
+              </a:pPr>
+              <a:r>
+                <a:rPr lang="fr-FR" sz="2300" dirty="0" smtClean="0"/>
                 <a:t>description</a:t>
               </a:r>
+              <a:endParaRPr lang="fr-FR" sz="2300" dirty="0"/>
             </a:p>
             <a:p>
               <a:pPr marL="494828" lvl="1" indent="-179670">
@@ -5974,7 +6040,7 @@
         </p:nvGrpSpPr>
         <p:grpSpPr>
           <a:xfrm>
-            <a:off x="552376" y="389816"/>
+            <a:off x="630723" y="46240"/>
             <a:ext cx="5778139" cy="4166340"/>
             <a:chOff x="2535662" y="593684"/>
             <a:chExt cx="2321781" cy="1892419"/>
@@ -6313,29 +6379,7 @@
                     </a:schemeClr>
                   </a:solidFill>
                 </a:rPr>
-                <a:t>convert </a:t>
-              </a:r>
-              <a:r>
-                <a:rPr lang="en-US" sz="2000" dirty="0">
-                  <a:solidFill>
-                    <a:schemeClr val="tx1">
-                      <a:lumMod val="65000"/>
-                      <a:lumOff val="35000"/>
-                    </a:schemeClr>
-                  </a:solidFill>
-                </a:rPr>
-                <a:t>unit, rounded </a:t>
-              </a:r>
-              <a:r>
-                <a:rPr lang="en-US" sz="2000" dirty="0">
-                  <a:solidFill>
-                    <a:schemeClr val="tx1">
-                      <a:lumMod val="65000"/>
-                      <a:lumOff val="35000"/>
-                    </a:schemeClr>
-                  </a:solidFill>
-                </a:rPr>
-                <a:t>value, </a:t>
+                <a:t>convert unit, rounded value, </a:t>
               </a:r>
               <a:r>
                 <a:rPr lang="en-US" sz="2000" dirty="0" smtClean="0">
@@ -6452,10 +6496,10 @@
         </p:nvGrpSpPr>
         <p:grpSpPr>
           <a:xfrm>
-            <a:off x="720229" y="12697053"/>
-            <a:ext cx="5714944" cy="2964800"/>
-            <a:chOff x="6438161" y="729433"/>
-            <a:chExt cx="2419024" cy="1226723"/>
+            <a:off x="288182" y="10909324"/>
+            <a:ext cx="6833211" cy="5256585"/>
+            <a:chOff x="6109762" y="212336"/>
+            <a:chExt cx="2892364" cy="2174978"/>
           </a:xfrm>
         </p:grpSpPr>
         <p:sp>
@@ -6466,8 +6510,8 @@
           </p:nvSpPr>
           <p:spPr>
             <a:xfrm>
-              <a:off x="6438161" y="957964"/>
-              <a:ext cx="2419024" cy="998192"/>
+              <a:off x="6109762" y="455850"/>
+              <a:ext cx="2892364" cy="1931464"/>
             </a:xfrm>
             <a:prstGeom prst="rect">
               <a:avLst/>
@@ -6658,15 +6702,7 @@
                     <a:srgbClr val="7030A0"/>
                   </a:solidFill>
                 </a:rPr>
-                <a:t>, </a:t>
-              </a:r>
-              <a:r>
-                <a:rPr lang="fr-FR" sz="2300" dirty="0">
-                  <a:solidFill>
-                    <a:srgbClr val="7030A0"/>
-                  </a:solidFill>
-                </a:rPr>
-                <a:t>…’</a:t>
+                <a:t>, …’</a:t>
               </a:r>
               <a:br>
                 <a:rPr lang="fr-FR" sz="2300" dirty="0">
@@ -6681,38 +6717,339 @@
                     <a:srgbClr val="7030A0"/>
                   </a:solidFill>
                 </a:rPr>
-                <a:t>	‘</a:t>
+                <a:t>	</a:t>
+              </a:r>
+              <a:r>
+                <a:rPr lang="fr-FR" sz="2000" dirty="0">
+                  <a:solidFill>
+                    <a:schemeClr val="tx1"/>
+                  </a:solidFill>
+                </a:rPr>
+                <a:t>‘</a:t>
               </a:r>
               <a:r>
                 <a:rPr lang="en-US" sz="2000" dirty="0">
                   <a:solidFill>
-                    <a:schemeClr val="tx1">
-                      <a:lumMod val="65000"/>
-                      <a:lumOff val="35000"/>
-                    </a:schemeClr>
-                  </a:solidFill>
-                </a:rPr>
-                <a:t>to convert unit, rounded value, </a:t>
+                    <a:schemeClr val="tx1"/>
+                  </a:solidFill>
+                </a:rPr>
+                <a:t>to convert unit, rounded value, ...’</a:t>
+              </a:r>
+            </a:p>
+            <a:p>
+              <a:pPr marL="177800" lvl="1" indent="-177800">
+                <a:buFontTx/>
+                <a:buChar char="-"/>
+              </a:pPr>
+              <a:r>
+                <a:rPr lang="en-US" sz="2300" dirty="0" smtClean="0"/>
+                <a:t>Incremental </a:t>
+              </a:r>
+              <a:r>
+                <a:rPr lang="en-US" sz="2300" dirty="0" smtClean="0"/>
+                <a:t>: </a:t>
+              </a:r>
+              <a:r>
+                <a:rPr lang="fr-FR" sz="2300" dirty="0" smtClean="0">
+                  <a:solidFill>
+                    <a:srgbClr val="7030A0"/>
+                  </a:solidFill>
+                </a:rPr>
+                <a:t>‘</a:t>
+              </a:r>
+              <a:r>
+                <a:rPr lang="fr-FR" sz="2300" dirty="0" err="1">
+                  <a:solidFill>
+                    <a:srgbClr val="7030A0"/>
+                  </a:solidFill>
+                </a:rPr>
+                <a:t>true</a:t>
+              </a:r>
+              <a:r>
+                <a:rPr lang="fr-FR" sz="2300" dirty="0">
+                  <a:solidFill>
+                    <a:srgbClr val="7030A0"/>
+                  </a:solidFill>
+                </a:rPr>
+                <a:t>, false’ </a:t>
+              </a:r>
+              <a:r>
+                <a:rPr lang="fr-FR" sz="2000" dirty="0" smtClean="0">
+                  <a:solidFill>
+                    <a:schemeClr val="tx1"/>
+                  </a:solidFill>
+                </a:rPr>
+                <a:t>‘</a:t>
               </a:r>
               <a:r>
                 <a:rPr lang="en-US" sz="2000" dirty="0" smtClean="0">
                   <a:solidFill>
-                    <a:schemeClr val="tx1">
-                      <a:lumMod val="65000"/>
-                      <a:lumOff val="35000"/>
-                    </a:schemeClr>
-                  </a:solidFill>
-                </a:rPr>
-                <a:t>...’</a:t>
-              </a:r>
-              <a:endParaRPr lang="fr-FR" sz="2000" dirty="0">
+                    <a:schemeClr val="tx1"/>
+                  </a:solidFill>
+                </a:rPr>
+                <a:t>store ≠ or current value’</a:t>
+              </a:r>
+              <a:endParaRPr lang="en-US" sz="2000" dirty="0">
                 <a:solidFill>
-                  <a:schemeClr val="tx1">
-                    <a:lumMod val="65000"/>
-                    <a:lumOff val="35000"/>
-                  </a:schemeClr>
+                  <a:schemeClr val="tx1"/>
                 </a:solidFill>
               </a:endParaRPr>
+            </a:p>
+            <a:p>
+              <a:pPr marL="177800" lvl="1" indent="-177800">
+                <a:buFontTx/>
+                <a:buChar char="-"/>
+              </a:pPr>
+              <a:r>
+                <a:rPr lang="en-US" sz="2300" dirty="0"/>
+                <a:t>history </a:t>
+              </a:r>
+              <a:r>
+                <a:rPr lang="en-US" sz="2300" dirty="0"/>
+                <a:t>:</a:t>
+              </a:r>
+              <a:r>
+                <a:rPr lang="en-US" sz="2000" dirty="0">
+                  <a:solidFill>
+                    <a:schemeClr val="tx1"/>
+                  </a:solidFill>
+                </a:rPr>
+                <a:t> ’define what to store in the history </a:t>
+              </a:r>
+              <a:r>
+                <a:rPr lang="en-US" sz="2000" dirty="0" smtClean="0">
+                  <a:solidFill>
+                    <a:schemeClr val="tx1"/>
+                  </a:solidFill>
+                </a:rPr>
+                <a:t>table’</a:t>
+              </a:r>
+              <a:endParaRPr lang="en-US" sz="2000" dirty="0">
+                <a:solidFill>
+                  <a:schemeClr val="tx1"/>
+                </a:solidFill>
+              </a:endParaRPr>
+            </a:p>
+            <a:p>
+              <a:pPr marL="530225" lvl="2" indent="-187325">
+                <a:buFontTx/>
+                <a:buChar char="-"/>
+                <a:tabLst>
+                  <a:tab pos="533400" algn="l"/>
+                </a:tabLst>
+              </a:pPr>
+              <a:r>
+                <a:rPr lang="en-US" sz="2300" dirty="0" smtClean="0"/>
+                <a:t>store </a:t>
+              </a:r>
+              <a:r>
+                <a:rPr lang="en-US" sz="2300" dirty="0" smtClean="0"/>
+                <a:t>: </a:t>
+              </a:r>
+              <a:r>
+                <a:rPr lang="fr-FR" sz="2300" dirty="0" smtClean="0">
+                  <a:solidFill>
+                    <a:srgbClr val="7030A0"/>
+                  </a:solidFill>
+                </a:rPr>
+                <a:t>‘</a:t>
+              </a:r>
+              <a:r>
+                <a:rPr lang="fr-FR" sz="2300" dirty="0" err="1">
+                  <a:solidFill>
+                    <a:srgbClr val="7030A0"/>
+                  </a:solidFill>
+                </a:rPr>
+                <a:t>true</a:t>
+              </a:r>
+              <a:r>
+                <a:rPr lang="fr-FR" sz="2300" dirty="0">
+                  <a:solidFill>
+                    <a:srgbClr val="7030A0"/>
+                  </a:solidFill>
+                </a:rPr>
+                <a:t>, false’ </a:t>
+              </a:r>
+              <a:r>
+                <a:rPr lang="en-US" sz="2000" dirty="0" smtClean="0">
+                  <a:solidFill>
+                    <a:schemeClr val="tx1"/>
+                  </a:solidFill>
+                </a:rPr>
+                <a:t>‘to store </a:t>
+              </a:r>
+              <a:r>
+                <a:rPr lang="en-US" sz="2000" dirty="0">
+                  <a:solidFill>
+                    <a:schemeClr val="tx1"/>
+                  </a:solidFill>
+                </a:rPr>
+                <a:t>in </a:t>
+              </a:r>
+              <a:r>
+                <a:rPr lang="en-US" sz="2000" dirty="0" smtClean="0">
+                  <a:solidFill>
+                    <a:schemeClr val="tx1"/>
+                  </a:solidFill>
+                </a:rPr>
+                <a:t>history table’</a:t>
+              </a:r>
+              <a:endParaRPr lang="en-US" sz="2000" dirty="0">
+                <a:solidFill>
+                  <a:schemeClr val="tx1"/>
+                </a:solidFill>
+              </a:endParaRPr>
+            </a:p>
+            <a:p>
+              <a:pPr marL="530225" lvl="2" indent="-187325">
+                <a:buFontTx/>
+                <a:buChar char="-"/>
+                <a:tabLst>
+                  <a:tab pos="533400" algn="l"/>
+                </a:tabLst>
+              </a:pPr>
+              <a:r>
+                <a:rPr lang="en-US" sz="2300" dirty="0" smtClean="0"/>
+                <a:t>max : </a:t>
+              </a:r>
+              <a:r>
+                <a:rPr lang="en-US" sz="2000" dirty="0" smtClean="0">
+                  <a:solidFill>
+                    <a:schemeClr val="tx1"/>
+                  </a:solidFill>
+                </a:rPr>
+                <a:t>‘max number of </a:t>
+              </a:r>
+              <a:r>
+                <a:rPr lang="en-US" sz="2000" dirty="0" err="1" smtClean="0">
+                  <a:solidFill>
+                    <a:schemeClr val="tx1"/>
+                  </a:solidFill>
+                </a:rPr>
+                <a:t>rescords</a:t>
+              </a:r>
+              <a:r>
+                <a:rPr lang="en-US" sz="2000" dirty="0" smtClean="0">
+                  <a:solidFill>
+                    <a:schemeClr val="tx1"/>
+                  </a:solidFill>
+                </a:rPr>
+                <a:t>, 0 -&gt; infinite’</a:t>
+              </a:r>
+              <a:endParaRPr lang="en-US" sz="2000" dirty="0">
+                <a:solidFill>
+                  <a:schemeClr val="tx1"/>
+                </a:solidFill>
+              </a:endParaRPr>
+            </a:p>
+            <a:p>
+              <a:pPr marL="530225" lvl="2" indent="-187325">
+                <a:buFontTx/>
+                <a:buChar char="-"/>
+                <a:tabLst>
+                  <a:tab pos="533400" algn="l"/>
+                </a:tabLst>
+              </a:pPr>
+              <a:r>
+                <a:rPr lang="en-US" sz="2300" dirty="0" smtClean="0"/>
+                <a:t>expire : </a:t>
+              </a:r>
+              <a:r>
+                <a:rPr lang="en-US" sz="2000" dirty="0" smtClean="0">
+                  <a:solidFill>
+                    <a:schemeClr val="tx1"/>
+                  </a:solidFill>
+                </a:rPr>
+                <a:t>’how long records kept, 0 -&gt; forever’</a:t>
+              </a:r>
+              <a:endParaRPr lang="en-US" sz="2000" dirty="0">
+                <a:solidFill>
+                  <a:schemeClr val="tx1"/>
+                </a:solidFill>
+              </a:endParaRPr>
+            </a:p>
+            <a:p>
+              <a:pPr marL="530225" lvl="2" indent="-187325">
+                <a:buFontTx/>
+                <a:buChar char="-"/>
+                <a:tabLst>
+                  <a:tab pos="533400" algn="l"/>
+                </a:tabLst>
+              </a:pPr>
+              <a:r>
+                <a:rPr lang="en-US" sz="2300" dirty="0" err="1" smtClean="0"/>
+                <a:t>round_value</a:t>
+              </a:r>
+              <a:r>
+                <a:rPr lang="en-US" sz="2300" dirty="0" smtClean="0"/>
+                <a:t> </a:t>
+              </a:r>
+              <a:r>
+                <a:rPr lang="en-US" sz="2300" dirty="0" smtClean="0"/>
+                <a:t>: </a:t>
+              </a:r>
+              <a:r>
+                <a:rPr lang="en-US" sz="2000" dirty="0" smtClean="0">
+                  <a:solidFill>
+                    <a:schemeClr val="tx1"/>
+                  </a:solidFill>
+                </a:rPr>
+                <a:t>’store rounded value,  0-&gt; no’</a:t>
+              </a:r>
+            </a:p>
+            <a:p>
+              <a:pPr marL="530225" lvl="2" indent="-187325">
+                <a:buFontTx/>
+                <a:buChar char="-"/>
+                <a:tabLst>
+                  <a:tab pos="533400" algn="l"/>
+                </a:tabLst>
+              </a:pPr>
+              <a:r>
+                <a:rPr lang="en-US" sz="2300" dirty="0" smtClean="0"/>
+                <a:t>duplicate :</a:t>
+              </a:r>
+              <a:r>
+                <a:rPr lang="fr-FR" sz="2300" dirty="0" smtClean="0">
+                  <a:solidFill>
+                    <a:srgbClr val="7030A0"/>
+                  </a:solidFill>
+                </a:rPr>
+                <a:t>‘</a:t>
+              </a:r>
+              <a:r>
+                <a:rPr lang="fr-FR" sz="2300" dirty="0" err="1">
+                  <a:solidFill>
+                    <a:srgbClr val="7030A0"/>
+                  </a:solidFill>
+                </a:rPr>
+                <a:t>true</a:t>
+              </a:r>
+              <a:r>
+                <a:rPr lang="fr-FR" sz="2300" dirty="0">
+                  <a:solidFill>
+                    <a:srgbClr val="7030A0"/>
+                  </a:solidFill>
+                </a:rPr>
+                <a:t>, </a:t>
+              </a:r>
+              <a:r>
+                <a:rPr lang="fr-FR" sz="2300" dirty="0" smtClean="0">
+                  <a:solidFill>
+                    <a:srgbClr val="7030A0"/>
+                  </a:solidFill>
+                </a:rPr>
+                <a:t>false’ </a:t>
+              </a:r>
+              <a:r>
+                <a:rPr lang="en-US" sz="2000" dirty="0" smtClean="0">
+                  <a:solidFill>
+                    <a:schemeClr val="tx1"/>
+                  </a:solidFill>
+                </a:rPr>
+                <a:t>’store rounded and original value’</a:t>
+              </a:r>
+              <a:endParaRPr lang="fr-FR" sz="2300" dirty="0"/>
             </a:p>
           </p:txBody>
         </p:sp>
@@ -6724,7 +7061,7 @@
           </p:nvSpPr>
           <p:spPr>
             <a:xfrm>
-              <a:off x="6438161" y="729433"/>
+              <a:off x="6109762" y="212336"/>
               <a:ext cx="559263" cy="243514"/>
             </a:xfrm>
             <a:prstGeom prst="rect">
@@ -6762,10 +7099,10 @@
         </p:nvGrpSpPr>
         <p:grpSpPr>
           <a:xfrm>
-            <a:off x="7774296" y="8029004"/>
-            <a:ext cx="5691350" cy="7667400"/>
+            <a:off x="7918312" y="7812980"/>
+            <a:ext cx="5691350" cy="8064897"/>
             <a:chOff x="4772067" y="2796580"/>
-            <a:chExt cx="2469785" cy="3040197"/>
+            <a:chExt cx="2469785" cy="3197808"/>
           </a:xfrm>
         </p:grpSpPr>
         <p:sp>
@@ -6777,7 +7114,7 @@
           <p:spPr>
             <a:xfrm>
               <a:off x="4774939" y="2997793"/>
-              <a:ext cx="2466913" cy="2838984"/>
+              <a:ext cx="2466913" cy="2996595"/>
             </a:xfrm>
             <a:prstGeom prst="rect">
               <a:avLst/>
@@ -6854,8 +7191,60 @@
                 <a:buChar char="-"/>
               </a:pPr>
               <a:r>
-                <a:rPr lang="fr-FR" sz="2300" dirty="0"/>
-                <a:t>schema </a:t>
+                <a:rPr lang="fr-FR" sz="2300" dirty="0" err="1" smtClean="0"/>
+                <a:t>Schema</a:t>
+              </a:r>
+              <a:r>
+                <a:rPr lang="fr-FR" sz="2300" dirty="0" smtClean="0"/>
+                <a:t> : </a:t>
+              </a:r>
+              <a:r>
+                <a:rPr lang="fr-FR" sz="2300" dirty="0" smtClean="0">
+                  <a:solidFill>
+                    <a:srgbClr val="7030A0"/>
+                  </a:solidFill>
+                </a:rPr>
+                <a:t>’</a:t>
+              </a:r>
+              <a:r>
+                <a:rPr lang="fr-FR" sz="2300" dirty="0" err="1" smtClean="0">
+                  <a:solidFill>
+                    <a:srgbClr val="7030A0"/>
+                  </a:solidFill>
+                </a:rPr>
+                <a:t>sensor.basic</a:t>
+              </a:r>
+              <a:r>
+                <a:rPr lang="fr-FR" sz="2300" dirty="0" smtClean="0">
+                  <a:solidFill>
+                    <a:srgbClr val="7030A0"/>
+                  </a:solidFill>
+                </a:rPr>
+                <a:t>’ </a:t>
+              </a:r>
+              <a:r>
+                <a:rPr lang="fr-FR" sz="2000" b="1" dirty="0" smtClean="0">
+                  <a:solidFill>
+                    <a:srgbClr val="FFFF00"/>
+                  </a:solidFill>
+                </a:rPr>
+                <a:t>‘</a:t>
+              </a:r>
+              <a:r>
+                <a:rPr lang="fr-FR" sz="2000" b="1" dirty="0" err="1" smtClean="0">
+                  <a:solidFill>
+                    <a:srgbClr val="FFFF00"/>
+                  </a:solidFill>
+                </a:rPr>
+                <a:t>link</a:t>
+              </a:r>
+              <a:r>
+                <a:rPr lang="fr-FR" sz="2000" b="1" dirty="0" smtClean="0">
+                  <a:solidFill>
+                    <a:srgbClr val="FFFF00"/>
+                  </a:solidFill>
+                </a:rPr>
+                <a:t> </a:t>
               </a:r>
               <a:r>
                 <a:rPr lang="fr-FR" sz="2000" b="1" dirty="0">
@@ -6863,7 +7252,7 @@
                     <a:srgbClr val="FFFF00"/>
                   </a:solidFill>
                 </a:rPr>
-                <a:t>‘</a:t>
+                <a:t>to </a:t>
               </a:r>
               <a:r>
                 <a:rPr lang="fr-FR" sz="2000" b="1" dirty="0" err="1">
@@ -6871,7 +7260,7 @@
                     <a:srgbClr val="FFFF00"/>
                   </a:solidFill>
                 </a:rPr>
-                <a:t>link</a:t>
+                <a:t>xpl</a:t>
               </a:r>
               <a:r>
                 <a:rPr lang="fr-FR" sz="2000" b="1" dirty="0">
@@ -6879,24 +7268,29 @@
                     <a:srgbClr val="FFFF00"/>
                   </a:solidFill>
                 </a:rPr>
-                <a:t> to xpl schema like</a:t>
-              </a:r>
-              <a:r>
-                <a:rPr lang="fr-FR" sz="2300" dirty="0">
-                  <a:solidFill>
-                    <a:srgbClr val="7030A0"/>
-                  </a:solidFill>
-                </a:rPr>
-                <a:t> sensor.basic</a:t>
-              </a:r>
-              <a:r>
-                <a:rPr lang="fr-FR" sz="2000" b="1" dirty="0">
+                <a:t> </a:t>
+              </a:r>
+              <a:r>
+                <a:rPr lang="fr-FR" sz="2000" b="1" dirty="0" err="1" smtClean="0">
                   <a:solidFill>
                     <a:srgbClr val="FFFF00"/>
                   </a:solidFill>
                 </a:rPr>
+                <a:t>schema</a:t>
+              </a:r>
+              <a:r>
+                <a:rPr lang="fr-FR" sz="2000" b="1" dirty="0" smtClean="0">
+                  <a:solidFill>
+                    <a:srgbClr val="FFFF00"/>
+                  </a:solidFill>
+                </a:rPr>
                 <a:t>’</a:t>
               </a:r>
+              <a:endParaRPr lang="fr-FR" sz="2000" b="1" dirty="0">
+                <a:solidFill>
+                  <a:srgbClr val="FFFF00"/>
+                </a:solidFill>
+              </a:endParaRPr>
             </a:p>
             <a:p>
               <a:pPr marL="170834" indent="-170834">
@@ -7469,6 +7863,60 @@
               <a:r>
                 <a:rPr lang="fr-FR" sz="2300" dirty="0" smtClean="0"/>
                 <a:t> : </a:t>
+              </a:r>
+              <a:r>
+                <a:rPr lang="fr-FR" sz="2000" b="1" dirty="0">
+                  <a:solidFill>
+                    <a:schemeClr val="accent6">
+                      <a:lumMod val="60000"/>
+                      <a:lumOff val="40000"/>
+                    </a:schemeClr>
+                  </a:solidFill>
+                </a:rPr>
+                <a:t>‘</a:t>
+              </a:r>
+              <a:r>
+                <a:rPr lang="fr-FR" sz="2000" b="1" dirty="0" err="1">
+                  <a:solidFill>
+                    <a:schemeClr val="accent6">
+                      <a:lumMod val="60000"/>
+                      <a:lumOff val="40000"/>
+                    </a:schemeClr>
+                  </a:solidFill>
+                </a:rPr>
+                <a:t>optional</a:t>
+              </a:r>
+              <a:r>
+                <a:rPr lang="fr-FR" sz="2000" b="1" dirty="0" smtClean="0">
+                  <a:solidFill>
+                    <a:schemeClr val="accent6">
+                      <a:lumMod val="60000"/>
+                      <a:lumOff val="40000"/>
+                    </a:schemeClr>
+                  </a:solidFill>
+                </a:rPr>
+                <a:t>’</a:t>
+              </a:r>
+              <a:br>
+                <a:rPr lang="fr-FR" sz="2000" b="1" dirty="0" smtClean="0">
+                  <a:solidFill>
+                    <a:schemeClr val="accent6">
+                      <a:lumMod val="60000"/>
+                      <a:lumOff val="40000"/>
+                    </a:schemeClr>
+                  </a:solidFill>
+                </a:rPr>
+              </a:br>
+              <a:r>
+                <a:rPr lang="fr-FR" sz="2000" b="1" dirty="0" smtClean="0">
+                  <a:solidFill>
+                    <a:schemeClr val="accent6">
+                      <a:lumMod val="60000"/>
+                      <a:lumOff val="40000"/>
+                    </a:schemeClr>
+                  </a:solidFill>
+                </a:rPr>
+                <a:t>	  </a:t>
               </a:r>
               <a:r>
                 <a:rPr lang="fr-FR" sz="2000" b="1" dirty="0" smtClean="0">
@@ -7561,10 +8009,10 @@
         </p:nvGrpSpPr>
         <p:grpSpPr>
           <a:xfrm>
-            <a:off x="7735480" y="818242"/>
-            <a:ext cx="5717162" cy="6101722"/>
-            <a:chOff x="-725094" y="3271369"/>
-            <a:chExt cx="2419962" cy="2582740"/>
+            <a:off x="7827258" y="818242"/>
+            <a:ext cx="5710396" cy="6101722"/>
+            <a:chOff x="-686246" y="3271369"/>
+            <a:chExt cx="2417098" cy="2582740"/>
           </a:xfrm>
         </p:grpSpPr>
         <p:sp>
@@ -7575,7 +8023,7 @@
           </p:nvSpPr>
           <p:spPr>
             <a:xfrm>
-              <a:off x="-722230" y="3478903"/>
+              <a:off x="-686246" y="3478903"/>
               <a:ext cx="2417098" cy="2375206"/>
             </a:xfrm>
             <a:prstGeom prst="rect">
@@ -7651,36 +8099,93 @@
                     <a:srgbClr val="FFFF00"/>
                   </a:solidFill>
                 </a:rPr>
-                <a:t>: ‘</a:t>
-              </a:r>
-              <a:r>
-                <a:rPr lang="fr-FR" sz="2000" b="1" dirty="0" err="1">
+                <a:t>: </a:t>
+              </a:r>
+              <a:r>
+                <a:rPr lang="fr-FR" sz="2300" dirty="0">
+                  <a:solidFill>
+                    <a:srgbClr val="7030A0"/>
+                  </a:solidFill>
+                </a:rPr>
+                <a:t>’</a:t>
+              </a:r>
+              <a:r>
+                <a:rPr lang="fr-FR" sz="2300" dirty="0" err="1">
+                  <a:solidFill>
+                    <a:srgbClr val="7030A0"/>
+                  </a:solidFill>
+                </a:rPr>
+                <a:t>lighting.basic</a:t>
+              </a:r>
+              <a:r>
+                <a:rPr lang="fr-FR" sz="2300" dirty="0">
+                  <a:solidFill>
+                    <a:srgbClr val="7030A0"/>
+                  </a:solidFill>
+                </a:rPr>
+                <a:t>’</a:t>
+              </a:r>
+              <a:r>
+                <a:rPr lang="fr-FR" sz="2000" dirty="0" smtClean="0">
+                  <a:solidFill>
+                    <a:srgbClr val="7030A0"/>
+                  </a:solidFill>
+                </a:rPr>
+                <a:t> </a:t>
+              </a:r>
+              <a:r>
+                <a:rPr lang="fr-FR" sz="2000" b="1" dirty="0" smtClean="0">
                   <a:solidFill>
                     <a:srgbClr val="FFFF00"/>
                   </a:solidFill>
                 </a:rPr>
+                <a:t>‘</a:t>
+              </a:r>
+              <a:r>
+                <a:rPr lang="fr-FR" sz="2000" b="1" dirty="0" err="1" smtClean="0">
+                  <a:solidFill>
+                    <a:srgbClr val="FFFF00"/>
+                  </a:solidFill>
+                </a:rPr>
                 <a:t>link</a:t>
               </a:r>
               <a:r>
-                <a:rPr lang="fr-FR" sz="2000" b="1" dirty="0">
+                <a:rPr lang="fr-FR" sz="2000" b="1" dirty="0" smtClean="0">
                   <a:solidFill>
                     <a:srgbClr val="FFFF00"/>
                   </a:solidFill>
                 </a:rPr>
-                <a:t> to xpl schema like </a:t>
-              </a:r>
-              <a:r>
-                <a:rPr lang="fr-FR" sz="2300" dirty="0">
-                  <a:solidFill>
-                    <a:srgbClr val="7030A0"/>
-                  </a:solidFill>
-                </a:rPr>
-                <a:t>lighting.basic</a:t>
-              </a:r>
-              <a:r>
-                <a:rPr lang="fr-FR" sz="2300" dirty="0"/>
+                <a:t> to </a:t>
+              </a:r>
+              <a:r>
+                <a:rPr lang="fr-FR" sz="2000" b="1" dirty="0" err="1" smtClean="0">
+                  <a:solidFill>
+                    <a:srgbClr val="FFFF00"/>
+                  </a:solidFill>
+                </a:rPr>
+                <a:t>xpl</a:t>
+              </a:r>
+              <a:r>
+                <a:rPr lang="fr-FR" sz="2000" b="1" dirty="0" smtClean="0">
+                  <a:solidFill>
+                    <a:srgbClr val="FFFF00"/>
+                  </a:solidFill>
+                </a:rPr>
+                <a:t> </a:t>
+              </a:r>
+              <a:r>
+                <a:rPr lang="fr-FR" sz="2000" b="1" dirty="0" err="1" smtClean="0">
+                  <a:solidFill>
+                    <a:srgbClr val="FFFF00"/>
+                  </a:solidFill>
+                </a:rPr>
+                <a:t>schema</a:t>
+              </a:r>
+              <a:r>
+                <a:rPr lang="fr-FR" sz="2300" dirty="0" smtClean="0"/>
                 <a:t>’</a:t>
               </a:r>
+              <a:endParaRPr lang="fr-FR" sz="2300" dirty="0"/>
             </a:p>
             <a:p>
               <a:pPr marL="170834" indent="-170834">
@@ -8204,7 +8709,7 @@
           </p:nvSpPr>
           <p:spPr>
             <a:xfrm>
-              <a:off x="-725094" y="3271369"/>
+              <a:off x="-685838" y="3271369"/>
               <a:ext cx="1045110" cy="227983"/>
             </a:xfrm>
             <a:prstGeom prst="rect">
@@ -8239,8 +8744,8 @@
         </p:nvCxnSpPr>
         <p:spPr>
           <a:xfrm flipV="1">
-            <a:off x="4720125" y="4556156"/>
-            <a:ext cx="383794" cy="1571578"/>
+            <a:off x="4942099" y="4212580"/>
+            <a:ext cx="228795" cy="652343"/>
           </a:xfrm>
           <a:prstGeom prst="straightConnector1">
             <a:avLst/>
@@ -8275,8 +8780,8 @@
         </p:nvCxnSpPr>
         <p:spPr>
           <a:xfrm>
-            <a:off x="12980887" y="10243138"/>
-            <a:ext cx="1637353" cy="1012500"/>
+            <a:off x="13249622" y="9959435"/>
+            <a:ext cx="1368618" cy="1296203"/>
           </a:xfrm>
           <a:prstGeom prst="straightConnector1">
             <a:avLst/>
@@ -8313,8 +8818,8 @@
         </p:nvCxnSpPr>
         <p:spPr>
           <a:xfrm>
-            <a:off x="12889582" y="11255638"/>
-            <a:ext cx="1728658" cy="229750"/>
+            <a:off x="13028473" y="11064049"/>
+            <a:ext cx="1589767" cy="421339"/>
           </a:xfrm>
           <a:prstGeom prst="straightConnector1">
             <a:avLst/>
@@ -8351,8 +8856,8 @@
         </p:nvCxnSpPr>
         <p:spPr>
           <a:xfrm flipV="1">
-            <a:off x="13028473" y="11845428"/>
-            <a:ext cx="1600993" cy="1978960"/>
+            <a:off x="13249622" y="11845428"/>
+            <a:ext cx="1379844" cy="1800200"/>
           </a:xfrm>
           <a:prstGeom prst="straightConnector1">
             <a:avLst/>
@@ -8491,8 +8996,8 @@
         </p:nvSpPr>
         <p:spPr>
           <a:xfrm rot="508523">
-            <a:off x="5026114" y="7486370"/>
-            <a:ext cx="9841518" cy="2686436"/>
+            <a:off x="4856450" y="7340074"/>
+            <a:ext cx="10022020" cy="2820162"/>
           </a:xfrm>
           <a:custGeom>
             <a:avLst/>
@@ -8953,6 +9458,102 @@
               <a:gd name="connsiteY2" fmla="*/ 171160 h 1137115"/>
               <a:gd name="connsiteX3" fmla="*/ 4165719 w 4165719"/>
               <a:gd name="connsiteY3" fmla="*/ 1137115 h 1137115"/>
+              <a:gd name="connsiteX0" fmla="*/ 0 w 4201372"/>
+              <a:gd name="connsiteY0" fmla="*/ 796757 h 1119837"/>
+              <a:gd name="connsiteX1" fmla="*/ 1860162 w 4201372"/>
+              <a:gd name="connsiteY1" fmla="*/ 65920 h 1119837"/>
+              <a:gd name="connsiteX2" fmla="*/ 3643695 w 4201372"/>
+              <a:gd name="connsiteY2" fmla="*/ 153882 h 1119837"/>
+              <a:gd name="connsiteX3" fmla="*/ 4201372 w 4201372"/>
+              <a:gd name="connsiteY3" fmla="*/ 1119837 h 1119837"/>
+              <a:gd name="connsiteX0" fmla="*/ 0 w 4201372"/>
+              <a:gd name="connsiteY0" fmla="*/ 811039 h 1134119"/>
+              <a:gd name="connsiteX1" fmla="*/ 1860162 w 4201372"/>
+              <a:gd name="connsiteY1" fmla="*/ 80202 h 1134119"/>
+              <a:gd name="connsiteX2" fmla="*/ 3630966 w 4201372"/>
+              <a:gd name="connsiteY2" fmla="*/ 137451 h 1134119"/>
+              <a:gd name="connsiteX3" fmla="*/ 4201372 w 4201372"/>
+              <a:gd name="connsiteY3" fmla="*/ 1134119 h 1134119"/>
+              <a:gd name="connsiteX0" fmla="*/ 0 w 4199339"/>
+              <a:gd name="connsiteY0" fmla="*/ 767209 h 1131355"/>
+              <a:gd name="connsiteX1" fmla="*/ 1858129 w 4199339"/>
+              <a:gd name="connsiteY1" fmla="*/ 77438 h 1131355"/>
+              <a:gd name="connsiteX2" fmla="*/ 3628933 w 4199339"/>
+              <a:gd name="connsiteY2" fmla="*/ 134687 h 1131355"/>
+              <a:gd name="connsiteX3" fmla="*/ 4199339 w 4199339"/>
+              <a:gd name="connsiteY3" fmla="*/ 1131355 h 1131355"/>
+              <a:gd name="connsiteX0" fmla="*/ 0 w 4188829"/>
+              <a:gd name="connsiteY0" fmla="*/ 609110 h 1121567"/>
+              <a:gd name="connsiteX1" fmla="*/ 1847619 w 4188829"/>
+              <a:gd name="connsiteY1" fmla="*/ 67650 h 1121567"/>
+              <a:gd name="connsiteX2" fmla="*/ 3618423 w 4188829"/>
+              <a:gd name="connsiteY2" fmla="*/ 124899 h 1121567"/>
+              <a:gd name="connsiteX3" fmla="*/ 4188829 w 4188829"/>
+              <a:gd name="connsiteY3" fmla="*/ 1121567 h 1121567"/>
+              <a:gd name="connsiteX0" fmla="*/ 0 w 4188829"/>
+              <a:gd name="connsiteY0" fmla="*/ 599124 h 1111581"/>
+              <a:gd name="connsiteX1" fmla="*/ 1847619 w 4188829"/>
+              <a:gd name="connsiteY1" fmla="*/ 57664 h 1111581"/>
+              <a:gd name="connsiteX2" fmla="*/ 3618423 w 4188829"/>
+              <a:gd name="connsiteY2" fmla="*/ 114913 h 1111581"/>
+              <a:gd name="connsiteX3" fmla="*/ 4188829 w 4188829"/>
+              <a:gd name="connsiteY3" fmla="*/ 1111581 h 1111581"/>
+              <a:gd name="connsiteX0" fmla="*/ 0 w 4188829"/>
+              <a:gd name="connsiteY0" fmla="*/ 639787 h 1152244"/>
+              <a:gd name="connsiteX1" fmla="*/ 1847619 w 4188829"/>
+              <a:gd name="connsiteY1" fmla="*/ 98327 h 1152244"/>
+              <a:gd name="connsiteX2" fmla="*/ 3635219 w 4188829"/>
+              <a:gd name="connsiteY2" fmla="*/ 104158 h 1152244"/>
+              <a:gd name="connsiteX3" fmla="*/ 4188829 w 4188829"/>
+              <a:gd name="connsiteY3" fmla="*/ 1152244 h 1152244"/>
+              <a:gd name="connsiteX0" fmla="*/ 0 w 4188829"/>
+              <a:gd name="connsiteY0" fmla="*/ 659664 h 1172121"/>
+              <a:gd name="connsiteX1" fmla="*/ 1865603 w 4188829"/>
+              <a:gd name="connsiteY1" fmla="*/ 74762 h 1172121"/>
+              <a:gd name="connsiteX2" fmla="*/ 3635219 w 4188829"/>
+              <a:gd name="connsiteY2" fmla="*/ 124035 h 1172121"/>
+              <a:gd name="connsiteX3" fmla="*/ 4188829 w 4188829"/>
+              <a:gd name="connsiteY3" fmla="*/ 1172121 h 1172121"/>
+              <a:gd name="connsiteX0" fmla="*/ 0 w 4188829"/>
+              <a:gd name="connsiteY0" fmla="*/ 688419 h 1200876"/>
+              <a:gd name="connsiteX1" fmla="*/ 1865603 w 4188829"/>
+              <a:gd name="connsiteY1" fmla="*/ 103517 h 1200876"/>
+              <a:gd name="connsiteX2" fmla="*/ 3628089 w 4188829"/>
+              <a:gd name="connsiteY2" fmla="*/ 104938 h 1200876"/>
+              <a:gd name="connsiteX3" fmla="*/ 4188829 w 4188829"/>
+              <a:gd name="connsiteY3" fmla="*/ 1200876 h 1200876"/>
+              <a:gd name="connsiteX0" fmla="*/ 0 w 4188829"/>
+              <a:gd name="connsiteY0" fmla="*/ 678685 h 1191142"/>
+              <a:gd name="connsiteX1" fmla="*/ 1865603 w 4188829"/>
+              <a:gd name="connsiteY1" fmla="*/ 93783 h 1191142"/>
+              <a:gd name="connsiteX2" fmla="*/ 3628089 w 4188829"/>
+              <a:gd name="connsiteY2" fmla="*/ 95204 h 1191142"/>
+              <a:gd name="connsiteX3" fmla="*/ 4188829 w 4188829"/>
+              <a:gd name="connsiteY3" fmla="*/ 1191142 h 1191142"/>
+              <a:gd name="connsiteX0" fmla="*/ 0 w 4237369"/>
+              <a:gd name="connsiteY0" fmla="*/ 575959 h 1195318"/>
+              <a:gd name="connsiteX1" fmla="*/ 1914143 w 4237369"/>
+              <a:gd name="connsiteY1" fmla="*/ 97959 h 1195318"/>
+              <a:gd name="connsiteX2" fmla="*/ 3676629 w 4237369"/>
+              <a:gd name="connsiteY2" fmla="*/ 99380 h 1195318"/>
+              <a:gd name="connsiteX3" fmla="*/ 4237369 w 4237369"/>
+              <a:gd name="connsiteY3" fmla="*/ 1195318 h 1195318"/>
+              <a:gd name="connsiteX0" fmla="*/ 0 w 4237369"/>
+              <a:gd name="connsiteY0" fmla="*/ 575959 h 1195318"/>
+              <a:gd name="connsiteX1" fmla="*/ 1914143 w 4237369"/>
+              <a:gd name="connsiteY1" fmla="*/ 97959 h 1195318"/>
+              <a:gd name="connsiteX2" fmla="*/ 3676629 w 4237369"/>
+              <a:gd name="connsiteY2" fmla="*/ 99380 h 1195318"/>
+              <a:gd name="connsiteX3" fmla="*/ 4237369 w 4237369"/>
+              <a:gd name="connsiteY3" fmla="*/ 1195318 h 1195318"/>
+              <a:gd name="connsiteX0" fmla="*/ 0 w 4242122"/>
+              <a:gd name="connsiteY0" fmla="*/ 542458 h 1193719"/>
+              <a:gd name="connsiteX1" fmla="*/ 1918896 w 4242122"/>
+              <a:gd name="connsiteY1" fmla="*/ 96360 h 1193719"/>
+              <a:gd name="connsiteX2" fmla="*/ 3681382 w 4242122"/>
+              <a:gd name="connsiteY2" fmla="*/ 97781 h 1193719"/>
+              <a:gd name="connsiteX3" fmla="*/ 4242122 w 4242122"/>
+              <a:gd name="connsiteY3" fmla="*/ 1193719 h 1193719"/>
             </a:gdLst>
             <a:ahLst/>
             <a:cxnLst>
@@ -8971,24 +9572,24 @@
             </a:cxnLst>
             <a:rect l="l" t="t" r="r" b="b"/>
             <a:pathLst>
-              <a:path w="4165719" h="1137115">
+              <a:path w="4242122" h="1193719">
                 <a:moveTo>
-                  <a:pt x="0" y="1053298"/>
+                  <a:pt x="0" y="542458"/>
                 </a:moveTo>
                 <a:cubicBezTo>
-                  <a:pt x="363603" y="594922"/>
-                  <a:pt x="1223169" y="230221"/>
-                  <a:pt x="1824509" y="83198"/>
+                  <a:pt x="471536" y="206592"/>
+                  <a:pt x="1305332" y="170473"/>
+                  <a:pt x="1918896" y="96360"/>
                 </a:cubicBezTo>
                 <a:cubicBezTo>
-                  <a:pt x="2425849" y="-63825"/>
-                  <a:pt x="3217841" y="-4493"/>
-                  <a:pt x="3608042" y="171160"/>
+                  <a:pt x="2532460" y="22247"/>
+                  <a:pt x="3291181" y="-77872"/>
+                  <a:pt x="3681382" y="97781"/>
                 </a:cubicBezTo>
                 <a:cubicBezTo>
-                  <a:pt x="3998243" y="346813"/>
-                  <a:pt x="3685689" y="1090404"/>
-                  <a:pt x="4165719" y="1137115"/>
+                  <a:pt x="4071583" y="273434"/>
+                  <a:pt x="3762092" y="1147008"/>
+                  <a:pt x="4242122" y="1193719"/>
                 </a:cubicBezTo>
               </a:path>
             </a:pathLst>
@@ -9022,7 +9623,7 @@
           <a:lstStyle/>
           <a:p>
             <a:pPr algn="ctr"/>
-            <a:endParaRPr lang="fr-FR"/>
+            <a:endParaRPr lang="fr-FR" dirty="0"/>
           </a:p>
         </p:txBody>
       </p:sp>
@@ -9034,8 +9635,8 @@
         </p:nvSpPr>
         <p:spPr>
           <a:xfrm rot="508523">
-            <a:off x="5280638" y="4316368"/>
-            <a:ext cx="8972510" cy="5619101"/>
+            <a:off x="5227244" y="4312411"/>
+            <a:ext cx="9126925" cy="4259700"/>
           </a:xfrm>
           <a:custGeom>
             <a:avLst/>
@@ -9528,6 +10129,166 @@
               <a:gd name="connsiteY2" fmla="*/ 989778 h 2378455"/>
               <a:gd name="connsiteX3" fmla="*/ 3797886 w 3797886"/>
               <a:gd name="connsiteY3" fmla="*/ 0 h 2378455"/>
+              <a:gd name="connsiteX0" fmla="*/ 0 w 3840326"/>
+              <a:gd name="connsiteY0" fmla="*/ 2148355 h 2148355"/>
+              <a:gd name="connsiteX1" fmla="*/ 1886784 w 3840326"/>
+              <a:gd name="connsiteY1" fmla="*/ 1256287 h 2148355"/>
+              <a:gd name="connsiteX2" fmla="*/ 3555461 w 3840326"/>
+              <a:gd name="connsiteY2" fmla="*/ 989778 h 2148355"/>
+              <a:gd name="connsiteX3" fmla="*/ 3840326 w 3840326"/>
+              <a:gd name="connsiteY3" fmla="*/ 0 h 2148355"/>
+              <a:gd name="connsiteX0" fmla="*/ 0 w 3840326"/>
+              <a:gd name="connsiteY0" fmla="*/ 2148355 h 2148355"/>
+              <a:gd name="connsiteX1" fmla="*/ 1886784 w 3840326"/>
+              <a:gd name="connsiteY1" fmla="*/ 1256287 h 2148355"/>
+              <a:gd name="connsiteX2" fmla="*/ 3555461 w 3840326"/>
+              <a:gd name="connsiteY2" fmla="*/ 989778 h 2148355"/>
+              <a:gd name="connsiteX3" fmla="*/ 3840326 w 3840326"/>
+              <a:gd name="connsiteY3" fmla="*/ 0 h 2148355"/>
+              <a:gd name="connsiteX0" fmla="*/ 0 w 3840326"/>
+              <a:gd name="connsiteY0" fmla="*/ 2148355 h 2148355"/>
+              <a:gd name="connsiteX1" fmla="*/ 1886784 w 3840326"/>
+              <a:gd name="connsiteY1" fmla="*/ 1256287 h 2148355"/>
+              <a:gd name="connsiteX2" fmla="*/ 3555461 w 3840326"/>
+              <a:gd name="connsiteY2" fmla="*/ 989778 h 2148355"/>
+              <a:gd name="connsiteX3" fmla="*/ 3840326 w 3840326"/>
+              <a:gd name="connsiteY3" fmla="*/ 0 h 2148355"/>
+              <a:gd name="connsiteX0" fmla="*/ 0 w 3800793"/>
+              <a:gd name="connsiteY0" fmla="*/ 2085397 h 2085397"/>
+              <a:gd name="connsiteX1" fmla="*/ 1847251 w 3800793"/>
+              <a:gd name="connsiteY1" fmla="*/ 1256287 h 2085397"/>
+              <a:gd name="connsiteX2" fmla="*/ 3515928 w 3800793"/>
+              <a:gd name="connsiteY2" fmla="*/ 989778 h 2085397"/>
+              <a:gd name="connsiteX3" fmla="*/ 3800793 w 3800793"/>
+              <a:gd name="connsiteY3" fmla="*/ 0 h 2085397"/>
+              <a:gd name="connsiteX0" fmla="*/ 0 w 3816744"/>
+              <a:gd name="connsiteY0" fmla="*/ 2087774 h 2087774"/>
+              <a:gd name="connsiteX1" fmla="*/ 1863202 w 3816744"/>
+              <a:gd name="connsiteY1" fmla="*/ 1256287 h 2087774"/>
+              <a:gd name="connsiteX2" fmla="*/ 3531879 w 3816744"/>
+              <a:gd name="connsiteY2" fmla="*/ 989778 h 2087774"/>
+              <a:gd name="connsiteX3" fmla="*/ 3816744 w 3816744"/>
+              <a:gd name="connsiteY3" fmla="*/ 0 h 2087774"/>
+              <a:gd name="connsiteX0" fmla="*/ 0 w 3816744"/>
+              <a:gd name="connsiteY0" fmla="*/ 2087774 h 2087774"/>
+              <a:gd name="connsiteX1" fmla="*/ 1863202 w 3816744"/>
+              <a:gd name="connsiteY1" fmla="*/ 1256287 h 2087774"/>
+              <a:gd name="connsiteX2" fmla="*/ 3531879 w 3816744"/>
+              <a:gd name="connsiteY2" fmla="*/ 989778 h 2087774"/>
+              <a:gd name="connsiteX3" fmla="*/ 3816744 w 3816744"/>
+              <a:gd name="connsiteY3" fmla="*/ 0 h 2087774"/>
+              <a:gd name="connsiteX0" fmla="*/ 0 w 3817219"/>
+              <a:gd name="connsiteY0" fmla="*/ 2084584 h 2084584"/>
+              <a:gd name="connsiteX1" fmla="*/ 1863677 w 3817219"/>
+              <a:gd name="connsiteY1" fmla="*/ 1256287 h 2084584"/>
+              <a:gd name="connsiteX2" fmla="*/ 3532354 w 3817219"/>
+              <a:gd name="connsiteY2" fmla="*/ 989778 h 2084584"/>
+              <a:gd name="connsiteX3" fmla="*/ 3817219 w 3817219"/>
+              <a:gd name="connsiteY3" fmla="*/ 0 h 2084584"/>
+              <a:gd name="connsiteX0" fmla="*/ 0 w 3817219"/>
+              <a:gd name="connsiteY0" fmla="*/ 2084584 h 2084584"/>
+              <a:gd name="connsiteX1" fmla="*/ 1863677 w 3817219"/>
+              <a:gd name="connsiteY1" fmla="*/ 1256287 h 2084584"/>
+              <a:gd name="connsiteX2" fmla="*/ 3532354 w 3817219"/>
+              <a:gd name="connsiteY2" fmla="*/ 989778 h 2084584"/>
+              <a:gd name="connsiteX3" fmla="*/ 3817219 w 3817219"/>
+              <a:gd name="connsiteY3" fmla="*/ 0 h 2084584"/>
+              <a:gd name="connsiteX0" fmla="*/ 0 w 3817219"/>
+              <a:gd name="connsiteY0" fmla="*/ 2084584 h 2084584"/>
+              <a:gd name="connsiteX1" fmla="*/ 1863677 w 3817219"/>
+              <a:gd name="connsiteY1" fmla="*/ 1256287 h 2084584"/>
+              <a:gd name="connsiteX2" fmla="*/ 3532354 w 3817219"/>
+              <a:gd name="connsiteY2" fmla="*/ 989778 h 2084584"/>
+              <a:gd name="connsiteX3" fmla="*/ 3817219 w 3817219"/>
+              <a:gd name="connsiteY3" fmla="*/ 0 h 2084584"/>
+              <a:gd name="connsiteX0" fmla="*/ 0 w 3817219"/>
+              <a:gd name="connsiteY0" fmla="*/ 2084584 h 2084584"/>
+              <a:gd name="connsiteX1" fmla="*/ 1863677 w 3817219"/>
+              <a:gd name="connsiteY1" fmla="*/ 1256287 h 2084584"/>
+              <a:gd name="connsiteX2" fmla="*/ 3532354 w 3817219"/>
+              <a:gd name="connsiteY2" fmla="*/ 989778 h 2084584"/>
+              <a:gd name="connsiteX3" fmla="*/ 3817219 w 3817219"/>
+              <a:gd name="connsiteY3" fmla="*/ 0 h 2084584"/>
+              <a:gd name="connsiteX0" fmla="*/ 0 w 3817219"/>
+              <a:gd name="connsiteY0" fmla="*/ 2084584 h 2084584"/>
+              <a:gd name="connsiteX1" fmla="*/ 1863677 w 3817219"/>
+              <a:gd name="connsiteY1" fmla="*/ 1256287 h 2084584"/>
+              <a:gd name="connsiteX2" fmla="*/ 3532354 w 3817219"/>
+              <a:gd name="connsiteY2" fmla="*/ 989778 h 2084584"/>
+              <a:gd name="connsiteX3" fmla="*/ 3817219 w 3817219"/>
+              <a:gd name="connsiteY3" fmla="*/ 0 h 2084584"/>
+              <a:gd name="connsiteX0" fmla="*/ 0 w 3828439"/>
+              <a:gd name="connsiteY0" fmla="*/ 2091351 h 2091351"/>
+              <a:gd name="connsiteX1" fmla="*/ 1874897 w 3828439"/>
+              <a:gd name="connsiteY1" fmla="*/ 1256287 h 2091351"/>
+              <a:gd name="connsiteX2" fmla="*/ 3543574 w 3828439"/>
+              <a:gd name="connsiteY2" fmla="*/ 989778 h 2091351"/>
+              <a:gd name="connsiteX3" fmla="*/ 3828439 w 3828439"/>
+              <a:gd name="connsiteY3" fmla="*/ 0 h 2091351"/>
+              <a:gd name="connsiteX0" fmla="*/ 0 w 3828439"/>
+              <a:gd name="connsiteY0" fmla="*/ 2091351 h 2091351"/>
+              <a:gd name="connsiteX1" fmla="*/ 1874897 w 3828439"/>
+              <a:gd name="connsiteY1" fmla="*/ 1256287 h 2091351"/>
+              <a:gd name="connsiteX2" fmla="*/ 3543574 w 3828439"/>
+              <a:gd name="connsiteY2" fmla="*/ 989778 h 2091351"/>
+              <a:gd name="connsiteX3" fmla="*/ 3828439 w 3828439"/>
+              <a:gd name="connsiteY3" fmla="*/ 0 h 2091351"/>
+              <a:gd name="connsiteX0" fmla="*/ 0 w 3828439"/>
+              <a:gd name="connsiteY0" fmla="*/ 2091351 h 2091351"/>
+              <a:gd name="connsiteX1" fmla="*/ 1874897 w 3828439"/>
+              <a:gd name="connsiteY1" fmla="*/ 1256287 h 2091351"/>
+              <a:gd name="connsiteX2" fmla="*/ 3543574 w 3828439"/>
+              <a:gd name="connsiteY2" fmla="*/ 989778 h 2091351"/>
+              <a:gd name="connsiteX3" fmla="*/ 3828439 w 3828439"/>
+              <a:gd name="connsiteY3" fmla="*/ 0 h 2091351"/>
+              <a:gd name="connsiteX0" fmla="*/ 0 w 3840667"/>
+              <a:gd name="connsiteY0" fmla="*/ 1954580 h 1954580"/>
+              <a:gd name="connsiteX1" fmla="*/ 1887125 w 3840667"/>
+              <a:gd name="connsiteY1" fmla="*/ 1256287 h 1954580"/>
+              <a:gd name="connsiteX2" fmla="*/ 3555802 w 3840667"/>
+              <a:gd name="connsiteY2" fmla="*/ 989778 h 1954580"/>
+              <a:gd name="connsiteX3" fmla="*/ 3840667 w 3840667"/>
+              <a:gd name="connsiteY3" fmla="*/ 0 h 1954580"/>
+              <a:gd name="connsiteX0" fmla="*/ 0 w 3840667"/>
+              <a:gd name="connsiteY0" fmla="*/ 1954580 h 1954580"/>
+              <a:gd name="connsiteX1" fmla="*/ 1887125 w 3840667"/>
+              <a:gd name="connsiteY1" fmla="*/ 1256287 h 1954580"/>
+              <a:gd name="connsiteX2" fmla="*/ 3555802 w 3840667"/>
+              <a:gd name="connsiteY2" fmla="*/ 989778 h 1954580"/>
+              <a:gd name="connsiteX3" fmla="*/ 3840667 w 3840667"/>
+              <a:gd name="connsiteY3" fmla="*/ 0 h 1954580"/>
+              <a:gd name="connsiteX0" fmla="*/ 0 w 3863247"/>
+              <a:gd name="connsiteY0" fmla="*/ 1803047 h 1803047"/>
+              <a:gd name="connsiteX1" fmla="*/ 1909705 w 3863247"/>
+              <a:gd name="connsiteY1" fmla="*/ 1256287 h 1803047"/>
+              <a:gd name="connsiteX2" fmla="*/ 3578382 w 3863247"/>
+              <a:gd name="connsiteY2" fmla="*/ 989778 h 1803047"/>
+              <a:gd name="connsiteX3" fmla="*/ 3863247 w 3863247"/>
+              <a:gd name="connsiteY3" fmla="*/ 0 h 1803047"/>
+              <a:gd name="connsiteX0" fmla="*/ 0 w 3863247"/>
+              <a:gd name="connsiteY0" fmla="*/ 1803047 h 1803047"/>
+              <a:gd name="connsiteX1" fmla="*/ 1909705 w 3863247"/>
+              <a:gd name="connsiteY1" fmla="*/ 1256287 h 1803047"/>
+              <a:gd name="connsiteX2" fmla="*/ 3578382 w 3863247"/>
+              <a:gd name="connsiteY2" fmla="*/ 989778 h 1803047"/>
+              <a:gd name="connsiteX3" fmla="*/ 3863247 w 3863247"/>
+              <a:gd name="connsiteY3" fmla="*/ 0 h 1803047"/>
+              <a:gd name="connsiteX0" fmla="*/ 0 w 3863247"/>
+              <a:gd name="connsiteY0" fmla="*/ 1803047 h 1803047"/>
+              <a:gd name="connsiteX1" fmla="*/ 1909705 w 3863247"/>
+              <a:gd name="connsiteY1" fmla="*/ 1256287 h 1803047"/>
+              <a:gd name="connsiteX2" fmla="*/ 3578382 w 3863247"/>
+              <a:gd name="connsiteY2" fmla="*/ 989778 h 1803047"/>
+              <a:gd name="connsiteX3" fmla="*/ 3863247 w 3863247"/>
+              <a:gd name="connsiteY3" fmla="*/ 0 h 1803047"/>
+              <a:gd name="connsiteX0" fmla="*/ 0 w 3863247"/>
+              <a:gd name="connsiteY0" fmla="*/ 1803047 h 1803047"/>
+              <a:gd name="connsiteX1" fmla="*/ 1909705 w 3863247"/>
+              <a:gd name="connsiteY1" fmla="*/ 1256287 h 1803047"/>
+              <a:gd name="connsiteX2" fmla="*/ 3578382 w 3863247"/>
+              <a:gd name="connsiteY2" fmla="*/ 989778 h 1803047"/>
+              <a:gd name="connsiteX3" fmla="*/ 3863247 w 3863247"/>
+              <a:gd name="connsiteY3" fmla="*/ 0 h 1803047"/>
             </a:gdLst>
             <a:ahLst/>
             <a:cxnLst>
@@ -9546,24 +10307,24 @@
             </a:cxnLst>
             <a:rect l="l" t="t" r="r" b="b"/>
             <a:pathLst>
-              <a:path w="3797886" h="2378455">
+              <a:path w="3863247" h="1803047">
                 <a:moveTo>
-                  <a:pt x="0" y="2378455"/>
+                  <a:pt x="0" y="1803047"/>
                 </a:moveTo>
                 <a:cubicBezTo>
-                  <a:pt x="438646" y="1839013"/>
-                  <a:pt x="1258841" y="1487733"/>
-                  <a:pt x="1844344" y="1256287"/>
+                  <a:pt x="509317" y="1409603"/>
+                  <a:pt x="1278686" y="1323617"/>
+                  <a:pt x="1909705" y="1256287"/>
                 </a:cubicBezTo>
                 <a:cubicBezTo>
-                  <a:pt x="2429848" y="1024841"/>
-                  <a:pt x="3275041" y="1102173"/>
-                  <a:pt x="3513021" y="989778"/>
+                  <a:pt x="2540724" y="1188957"/>
+                  <a:pt x="3340402" y="1102173"/>
+                  <a:pt x="3578382" y="989778"/>
                 </a:cubicBezTo>
                 <a:cubicBezTo>
-                  <a:pt x="3694497" y="749046"/>
-                  <a:pt x="3315929" y="66559"/>
-                  <a:pt x="3797886" y="0"/>
+                  <a:pt x="3759858" y="749046"/>
+                  <a:pt x="3381290" y="66559"/>
+                  <a:pt x="3863247" y="0"/>
                 </a:cubicBezTo>
               </a:path>
             </a:pathLst>
@@ -9609,8 +10370,8 @@
         </p:nvSpPr>
         <p:spPr>
           <a:xfrm rot="508523">
-            <a:off x="5534301" y="133013"/>
-            <a:ext cx="9483973" cy="4593023"/>
+            <a:off x="5472767" y="140801"/>
+            <a:ext cx="9544930" cy="4580675"/>
           </a:xfrm>
           <a:custGeom>
             <a:avLst/>
@@ -10057,6 +10818,26 @@
               <a:gd name="connsiteY3" fmla="*/ 1080822 h 1944136"/>
               <a:gd name="connsiteX4" fmla="*/ 4014377 w 4014377"/>
               <a:gd name="connsiteY4" fmla="*/ 1936435 h 1944136"/>
+              <a:gd name="connsiteX0" fmla="*/ 0 w 4027106"/>
+              <a:gd name="connsiteY0" fmla="*/ 1117036 h 1940397"/>
+              <a:gd name="connsiteX1" fmla="*/ 708969 w 4027106"/>
+              <a:gd name="connsiteY1" fmla="*/ 306612 h 1940397"/>
+              <a:gd name="connsiteX2" fmla="*/ 3045999 w 4027106"/>
+              <a:gd name="connsiteY2" fmla="*/ 38802 h 1940397"/>
+              <a:gd name="connsiteX3" fmla="*/ 3552445 w 4027106"/>
+              <a:gd name="connsiteY3" fmla="*/ 1077083 h 1940397"/>
+              <a:gd name="connsiteX4" fmla="*/ 4027106 w 4027106"/>
+              <a:gd name="connsiteY4" fmla="*/ 1932696 h 1940397"/>
+              <a:gd name="connsiteX0" fmla="*/ 0 w 4040179"/>
+              <a:gd name="connsiteY0" fmla="*/ 1027818 h 1938909"/>
+              <a:gd name="connsiteX1" fmla="*/ 722042 w 4040179"/>
+              <a:gd name="connsiteY1" fmla="*/ 305124 h 1938909"/>
+              <a:gd name="connsiteX2" fmla="*/ 3059072 w 4040179"/>
+              <a:gd name="connsiteY2" fmla="*/ 37314 h 1938909"/>
+              <a:gd name="connsiteX3" fmla="*/ 3565518 w 4040179"/>
+              <a:gd name="connsiteY3" fmla="*/ 1075595 h 1938909"/>
+              <a:gd name="connsiteX4" fmla="*/ 4040179 w 4040179"/>
+              <a:gd name="connsiteY4" fmla="*/ 1931208 h 1938909"/>
             </a:gdLst>
             <a:ahLst/>
             <a:cxnLst>
@@ -10078,29 +10859,29 @@
             </a:cxnLst>
             <a:rect l="l" t="t" r="r" b="b"/>
             <a:pathLst>
-              <a:path w="4014377" h="1944136">
+              <a:path w="4040179" h="1938909">
                 <a:moveTo>
-                  <a:pt x="0" y="1151488"/>
+                  <a:pt x="0" y="1027818"/>
                 </a:moveTo>
                 <a:cubicBezTo>
-                  <a:pt x="133256" y="951115"/>
-                  <a:pt x="231536" y="523058"/>
-                  <a:pt x="696240" y="310351"/>
+                  <a:pt x="133256" y="827445"/>
+                  <a:pt x="212197" y="470208"/>
+                  <a:pt x="722042" y="305124"/>
                 </a:cubicBezTo>
                 <a:cubicBezTo>
-                  <a:pt x="1160944" y="97644"/>
-                  <a:pt x="2559357" y="-85871"/>
-                  <a:pt x="3033270" y="42541"/>
+                  <a:pt x="1231887" y="140040"/>
+                  <a:pt x="2585159" y="-91098"/>
+                  <a:pt x="3059072" y="37314"/>
                 </a:cubicBezTo>
                 <a:cubicBezTo>
-                  <a:pt x="3507183" y="170953"/>
-                  <a:pt x="3497880" y="724695"/>
-                  <a:pt x="3539716" y="1080822"/>
+                  <a:pt x="3532985" y="165726"/>
+                  <a:pt x="3523682" y="719468"/>
+                  <a:pt x="3565518" y="1075595"/>
                 </a:cubicBezTo>
                 <a:cubicBezTo>
-                  <a:pt x="3578602" y="1411838"/>
-                  <a:pt x="3549930" y="2019410"/>
-                  <a:pt x="4014377" y="1936435"/>
+                  <a:pt x="3604404" y="1406611"/>
+                  <a:pt x="3575732" y="2014183"/>
+                  <a:pt x="4040179" y="1931208"/>
                 </a:cubicBezTo>
               </a:path>
             </a:pathLst>
@@ -10146,8 +10927,8 @@
         </p:nvSpPr>
         <p:spPr>
           <a:xfrm rot="508523">
-            <a:off x="5146905" y="324852"/>
-            <a:ext cx="16021807" cy="4385864"/>
+            <a:off x="5146659" y="333186"/>
+            <a:ext cx="16021436" cy="4377512"/>
           </a:xfrm>
           <a:custGeom>
             <a:avLst/>
@@ -10856,6 +11637,26 @@
               <a:gd name="connsiteY3" fmla="*/ 1507113 h 1856451"/>
               <a:gd name="connsiteX4" fmla="*/ 6357144 w 6781712"/>
               <a:gd name="connsiteY4" fmla="*/ 1856451 h 1856451"/>
+              <a:gd name="connsiteX0" fmla="*/ 0 w 6768482"/>
+              <a:gd name="connsiteY0" fmla="*/ 1523159 h 1854780"/>
+              <a:gd name="connsiteX1" fmla="*/ 1284439 w 6768482"/>
+              <a:gd name="connsiteY1" fmla="*/ 379984 h 1854780"/>
+              <a:gd name="connsiteX2" fmla="*/ 5875913 w 6768482"/>
+              <a:gd name="connsiteY2" fmla="*/ 64093 h 1854780"/>
+              <a:gd name="connsiteX3" fmla="*/ 6760154 w 6768482"/>
+              <a:gd name="connsiteY3" fmla="*/ 1505442 h 1854780"/>
+              <a:gd name="connsiteX4" fmla="*/ 6343914 w 6768482"/>
+              <a:gd name="connsiteY4" fmla="*/ 1854780 h 1854780"/>
+              <a:gd name="connsiteX0" fmla="*/ 0 w 6781555"/>
+              <a:gd name="connsiteY0" fmla="*/ 1433565 h 1852916"/>
+              <a:gd name="connsiteX1" fmla="*/ 1297512 w 6781555"/>
+              <a:gd name="connsiteY1" fmla="*/ 378120 h 1852916"/>
+              <a:gd name="connsiteX2" fmla="*/ 5888986 w 6781555"/>
+              <a:gd name="connsiteY2" fmla="*/ 62229 h 1852916"/>
+              <a:gd name="connsiteX3" fmla="*/ 6773227 w 6781555"/>
+              <a:gd name="connsiteY3" fmla="*/ 1503578 h 1852916"/>
+              <a:gd name="connsiteX4" fmla="*/ 6356987 w 6781555"/>
+              <a:gd name="connsiteY4" fmla="*/ 1852916 h 1852916"/>
             </a:gdLst>
             <a:ahLst/>
             <a:cxnLst>
@@ -10877,29 +11678,29 @@
             </a:cxnLst>
             <a:rect l="l" t="t" r="r" b="b"/>
             <a:pathLst>
-              <a:path w="6781712" h="1856451">
+              <a:path w="6781555" h="1852916">
                 <a:moveTo>
-                  <a:pt x="0" y="1600174"/>
+                  <a:pt x="0" y="1433565"/>
                 </a:moveTo>
                 <a:cubicBezTo>
-                  <a:pt x="442231" y="1193313"/>
-                  <a:pt x="316145" y="637390"/>
-                  <a:pt x="1297669" y="381655"/>
+                  <a:pt x="442231" y="1026704"/>
+                  <a:pt x="316014" y="606676"/>
+                  <a:pt x="1297512" y="378120"/>
                 </a:cubicBezTo>
                 <a:cubicBezTo>
-                  <a:pt x="2279193" y="125920"/>
-                  <a:pt x="4976524" y="-121812"/>
-                  <a:pt x="5889143" y="65764"/>
+                  <a:pt x="2279010" y="149564"/>
+                  <a:pt x="4976367" y="-125347"/>
+                  <a:pt x="5888986" y="62229"/>
                 </a:cubicBezTo>
                 <a:cubicBezTo>
-                  <a:pt x="6801762" y="253340"/>
-                  <a:pt x="6695384" y="1208665"/>
-                  <a:pt x="6773384" y="1507113"/>
+                  <a:pt x="6801605" y="249805"/>
+                  <a:pt x="6695227" y="1205130"/>
+                  <a:pt x="6773227" y="1503578"/>
                 </a:cubicBezTo>
                 <a:cubicBezTo>
-                  <a:pt x="6851384" y="1805561"/>
-                  <a:pt x="6355804" y="1850595"/>
-                  <a:pt x="6357144" y="1856451"/>
+                  <a:pt x="6851227" y="1802026"/>
+                  <a:pt x="6355647" y="1847060"/>
+                  <a:pt x="6356987" y="1852916"/>
                 </a:cubicBezTo>
               </a:path>
             </a:pathLst>
@@ -10950,8 +11751,8 @@
         </p:nvSpPr>
         <p:spPr>
           <a:xfrm rot="508523">
-            <a:off x="5508428" y="11472199"/>
-            <a:ext cx="12747026" cy="5123115"/>
+            <a:off x="3854838" y="11349675"/>
+            <a:ext cx="14413399" cy="5073097"/>
           </a:xfrm>
           <a:custGeom>
             <a:avLst/>
@@ -11460,6 +12261,442 @@
               <a:gd name="connsiteY2" fmla="*/ 1714627 h 2469136"/>
               <a:gd name="connsiteX3" fmla="*/ 5510401 w 5510401"/>
               <a:gd name="connsiteY3" fmla="*/ 0 h 2469136"/>
+              <a:gd name="connsiteX0" fmla="*/ 0 w 5834394"/>
+              <a:gd name="connsiteY0" fmla="*/ 1329837 h 2474124"/>
+              <a:gd name="connsiteX1" fmla="*/ 1373769 w 5834394"/>
+              <a:gd name="connsiteY1" fmla="*/ 2468904 h 2474124"/>
+              <a:gd name="connsiteX2" fmla="*/ 4915549 w 5834394"/>
+              <a:gd name="connsiteY2" fmla="*/ 1714627 h 2474124"/>
+              <a:gd name="connsiteX3" fmla="*/ 5834394 w 5834394"/>
+              <a:gd name="connsiteY3" fmla="*/ 0 h 2474124"/>
+              <a:gd name="connsiteX0" fmla="*/ 0 w 5834394"/>
+              <a:gd name="connsiteY0" fmla="*/ 1329837 h 2474124"/>
+              <a:gd name="connsiteX1" fmla="*/ 1373769 w 5834394"/>
+              <a:gd name="connsiteY1" fmla="*/ 2468904 h 2474124"/>
+              <a:gd name="connsiteX2" fmla="*/ 4915549 w 5834394"/>
+              <a:gd name="connsiteY2" fmla="*/ 1714627 h 2474124"/>
+              <a:gd name="connsiteX3" fmla="*/ 5834394 w 5834394"/>
+              <a:gd name="connsiteY3" fmla="*/ 0 h 2474124"/>
+              <a:gd name="connsiteX0" fmla="*/ 0 w 5834394"/>
+              <a:gd name="connsiteY0" fmla="*/ 1329837 h 2470372"/>
+              <a:gd name="connsiteX1" fmla="*/ 799499 w 5834394"/>
+              <a:gd name="connsiteY1" fmla="*/ 1520349 h 2470372"/>
+              <a:gd name="connsiteX2" fmla="*/ 1373769 w 5834394"/>
+              <a:gd name="connsiteY2" fmla="*/ 2468904 h 2470372"/>
+              <a:gd name="connsiteX3" fmla="*/ 4915549 w 5834394"/>
+              <a:gd name="connsiteY3" fmla="*/ 1714627 h 2470372"/>
+              <a:gd name="connsiteX4" fmla="*/ 5834394 w 5834394"/>
+              <a:gd name="connsiteY4" fmla="*/ 0 h 2470372"/>
+              <a:gd name="connsiteX0" fmla="*/ 0 w 5834394"/>
+              <a:gd name="connsiteY0" fmla="*/ 1329837 h 2506224"/>
+              <a:gd name="connsiteX1" fmla="*/ 799499 w 5834394"/>
+              <a:gd name="connsiteY1" fmla="*/ 1520349 h 2506224"/>
+              <a:gd name="connsiteX2" fmla="*/ 1306414 w 5834394"/>
+              <a:gd name="connsiteY2" fmla="*/ 2504848 h 2506224"/>
+              <a:gd name="connsiteX3" fmla="*/ 4915549 w 5834394"/>
+              <a:gd name="connsiteY3" fmla="*/ 1714627 h 2506224"/>
+              <a:gd name="connsiteX4" fmla="*/ 5834394 w 5834394"/>
+              <a:gd name="connsiteY4" fmla="*/ 0 h 2506224"/>
+              <a:gd name="connsiteX0" fmla="*/ 0 w 5834394"/>
+              <a:gd name="connsiteY0" fmla="*/ 1329837 h 2507523"/>
+              <a:gd name="connsiteX1" fmla="*/ 799499 w 5834394"/>
+              <a:gd name="connsiteY1" fmla="*/ 1520349 h 2507523"/>
+              <a:gd name="connsiteX2" fmla="*/ 1306414 w 5834394"/>
+              <a:gd name="connsiteY2" fmla="*/ 2504848 h 2507523"/>
+              <a:gd name="connsiteX3" fmla="*/ 4968700 w 5834394"/>
+              <a:gd name="connsiteY3" fmla="*/ 1780059 h 2507523"/>
+              <a:gd name="connsiteX4" fmla="*/ 5834394 w 5834394"/>
+              <a:gd name="connsiteY4" fmla="*/ 0 h 2507523"/>
+              <a:gd name="connsiteX0" fmla="*/ 0 w 5834394"/>
+              <a:gd name="connsiteY0" fmla="*/ 1329837 h 2492148"/>
+              <a:gd name="connsiteX1" fmla="*/ 799499 w 5834394"/>
+              <a:gd name="connsiteY1" fmla="*/ 1520349 h 2492148"/>
+              <a:gd name="connsiteX2" fmla="*/ 1287696 w 5834394"/>
+              <a:gd name="connsiteY2" fmla="*/ 2489393 h 2492148"/>
+              <a:gd name="connsiteX3" fmla="*/ 4968700 w 5834394"/>
+              <a:gd name="connsiteY3" fmla="*/ 1780059 h 2492148"/>
+              <a:gd name="connsiteX4" fmla="*/ 5834394 w 5834394"/>
+              <a:gd name="connsiteY4" fmla="*/ 0 h 2492148"/>
+              <a:gd name="connsiteX0" fmla="*/ 0 w 5834394"/>
+              <a:gd name="connsiteY0" fmla="*/ 1329837 h 2492652"/>
+              <a:gd name="connsiteX1" fmla="*/ 1004342 w 5834394"/>
+              <a:gd name="connsiteY1" fmla="*/ 1495600 h 2492652"/>
+              <a:gd name="connsiteX2" fmla="*/ 1287696 w 5834394"/>
+              <a:gd name="connsiteY2" fmla="*/ 2489393 h 2492652"/>
+              <a:gd name="connsiteX3" fmla="*/ 4968700 w 5834394"/>
+              <a:gd name="connsiteY3" fmla="*/ 1780059 h 2492652"/>
+              <a:gd name="connsiteX4" fmla="*/ 5834394 w 5834394"/>
+              <a:gd name="connsiteY4" fmla="*/ 0 h 2492652"/>
+              <a:gd name="connsiteX0" fmla="*/ 0 w 5993495"/>
+              <a:gd name="connsiteY0" fmla="*/ 1198463 h 2492652"/>
+              <a:gd name="connsiteX1" fmla="*/ 1163443 w 5993495"/>
+              <a:gd name="connsiteY1" fmla="*/ 1495600 h 2492652"/>
+              <a:gd name="connsiteX2" fmla="*/ 1446797 w 5993495"/>
+              <a:gd name="connsiteY2" fmla="*/ 2489393 h 2492652"/>
+              <a:gd name="connsiteX3" fmla="*/ 5127801 w 5993495"/>
+              <a:gd name="connsiteY3" fmla="*/ 1780059 h 2492652"/>
+              <a:gd name="connsiteX4" fmla="*/ 5993495 w 5993495"/>
+              <a:gd name="connsiteY4" fmla="*/ 0 h 2492652"/>
+              <a:gd name="connsiteX0" fmla="*/ 0 w 5993495"/>
+              <a:gd name="connsiteY0" fmla="*/ 1198463 h 2495585"/>
+              <a:gd name="connsiteX1" fmla="*/ 1163955 w 5993495"/>
+              <a:gd name="connsiteY1" fmla="*/ 1374840 h 2495585"/>
+              <a:gd name="connsiteX2" fmla="*/ 1446797 w 5993495"/>
+              <a:gd name="connsiteY2" fmla="*/ 2489393 h 2495585"/>
+              <a:gd name="connsiteX3" fmla="*/ 5127801 w 5993495"/>
+              <a:gd name="connsiteY3" fmla="*/ 1780059 h 2495585"/>
+              <a:gd name="connsiteX4" fmla="*/ 5993495 w 5993495"/>
+              <a:gd name="connsiteY4" fmla="*/ 0 h 2495585"/>
+              <a:gd name="connsiteX0" fmla="*/ 0 w 5993495"/>
+              <a:gd name="connsiteY0" fmla="*/ 1198463 h 2495585"/>
+              <a:gd name="connsiteX1" fmla="*/ 1163955 w 5993495"/>
+              <a:gd name="connsiteY1" fmla="*/ 1374840 h 2495585"/>
+              <a:gd name="connsiteX2" fmla="*/ 1446797 w 5993495"/>
+              <a:gd name="connsiteY2" fmla="*/ 2489393 h 2495585"/>
+              <a:gd name="connsiteX3" fmla="*/ 5127801 w 5993495"/>
+              <a:gd name="connsiteY3" fmla="*/ 1780059 h 2495585"/>
+              <a:gd name="connsiteX4" fmla="*/ 5993495 w 5993495"/>
+              <a:gd name="connsiteY4" fmla="*/ 0 h 2495585"/>
+              <a:gd name="connsiteX0" fmla="*/ 0 w 5993495"/>
+              <a:gd name="connsiteY0" fmla="*/ 1198463 h 2493111"/>
+              <a:gd name="connsiteX1" fmla="*/ 1163955 w 5993495"/>
+              <a:gd name="connsiteY1" fmla="*/ 1374840 h 2493111"/>
+              <a:gd name="connsiteX2" fmla="*/ 1446797 w 5993495"/>
+              <a:gd name="connsiteY2" fmla="*/ 2489393 h 2493111"/>
+              <a:gd name="connsiteX3" fmla="*/ 5127801 w 5993495"/>
+              <a:gd name="connsiteY3" fmla="*/ 1780059 h 2493111"/>
+              <a:gd name="connsiteX4" fmla="*/ 5993495 w 5993495"/>
+              <a:gd name="connsiteY4" fmla="*/ 0 h 2493111"/>
+              <a:gd name="connsiteX0" fmla="*/ 0 w 5993495"/>
+              <a:gd name="connsiteY0" fmla="*/ 1198463 h 2497215"/>
+              <a:gd name="connsiteX1" fmla="*/ 1163955 w 5993495"/>
+              <a:gd name="connsiteY1" fmla="*/ 1374840 h 2497215"/>
+              <a:gd name="connsiteX2" fmla="*/ 1446797 w 5993495"/>
+              <a:gd name="connsiteY2" fmla="*/ 2489393 h 2497215"/>
+              <a:gd name="connsiteX3" fmla="*/ 5206755 w 5993495"/>
+              <a:gd name="connsiteY3" fmla="*/ 1866628 h 2497215"/>
+              <a:gd name="connsiteX4" fmla="*/ 5127801 w 5993495"/>
+              <a:gd name="connsiteY4" fmla="*/ 1780059 h 2497215"/>
+              <a:gd name="connsiteX5" fmla="*/ 5993495 w 5993495"/>
+              <a:gd name="connsiteY5" fmla="*/ 0 h 2497215"/>
+              <a:gd name="connsiteX0" fmla="*/ 0 w 5993495"/>
+              <a:gd name="connsiteY0" fmla="*/ 1198463 h 2491399"/>
+              <a:gd name="connsiteX1" fmla="*/ 1163955 w 5993495"/>
+              <a:gd name="connsiteY1" fmla="*/ 1374840 h 2491399"/>
+              <a:gd name="connsiteX2" fmla="*/ 1446797 w 5993495"/>
+              <a:gd name="connsiteY2" fmla="*/ 2489393 h 2491399"/>
+              <a:gd name="connsiteX3" fmla="*/ 5206755 w 5993495"/>
+              <a:gd name="connsiteY3" fmla="*/ 1866628 h 2491399"/>
+              <a:gd name="connsiteX4" fmla="*/ 5127801 w 5993495"/>
+              <a:gd name="connsiteY4" fmla="*/ 1780059 h 2491399"/>
+              <a:gd name="connsiteX5" fmla="*/ 5993495 w 5993495"/>
+              <a:gd name="connsiteY5" fmla="*/ 0 h 2491399"/>
+              <a:gd name="connsiteX0" fmla="*/ 0 w 5993495"/>
+              <a:gd name="connsiteY0" fmla="*/ 1198463 h 2491399"/>
+              <a:gd name="connsiteX1" fmla="*/ 1163955 w 5993495"/>
+              <a:gd name="connsiteY1" fmla="*/ 1374840 h 2491399"/>
+              <a:gd name="connsiteX2" fmla="*/ 1446797 w 5993495"/>
+              <a:gd name="connsiteY2" fmla="*/ 2489393 h 2491399"/>
+              <a:gd name="connsiteX3" fmla="*/ 5206755 w 5993495"/>
+              <a:gd name="connsiteY3" fmla="*/ 1866628 h 2491399"/>
+              <a:gd name="connsiteX4" fmla="*/ 5127801 w 5993495"/>
+              <a:gd name="connsiteY4" fmla="*/ 1780059 h 2491399"/>
+              <a:gd name="connsiteX5" fmla="*/ 5993495 w 5993495"/>
+              <a:gd name="connsiteY5" fmla="*/ 0 h 2491399"/>
+              <a:gd name="connsiteX0" fmla="*/ 0 w 6076160"/>
+              <a:gd name="connsiteY0" fmla="*/ 1202914 h 2491399"/>
+              <a:gd name="connsiteX1" fmla="*/ 1246620 w 6076160"/>
+              <a:gd name="connsiteY1" fmla="*/ 1374840 h 2491399"/>
+              <a:gd name="connsiteX2" fmla="*/ 1529462 w 6076160"/>
+              <a:gd name="connsiteY2" fmla="*/ 2489393 h 2491399"/>
+              <a:gd name="connsiteX3" fmla="*/ 5289420 w 6076160"/>
+              <a:gd name="connsiteY3" fmla="*/ 1866628 h 2491399"/>
+              <a:gd name="connsiteX4" fmla="*/ 5210466 w 6076160"/>
+              <a:gd name="connsiteY4" fmla="*/ 1780059 h 2491399"/>
+              <a:gd name="connsiteX5" fmla="*/ 6076160 w 6076160"/>
+              <a:gd name="connsiteY5" fmla="*/ 0 h 2491399"/>
+              <a:gd name="connsiteX0" fmla="*/ 0 w 6076160"/>
+              <a:gd name="connsiteY0" fmla="*/ 1202914 h 2491399"/>
+              <a:gd name="connsiteX1" fmla="*/ 1246620 w 6076160"/>
+              <a:gd name="connsiteY1" fmla="*/ 1374840 h 2491399"/>
+              <a:gd name="connsiteX2" fmla="*/ 1529462 w 6076160"/>
+              <a:gd name="connsiteY2" fmla="*/ 2489393 h 2491399"/>
+              <a:gd name="connsiteX3" fmla="*/ 5289420 w 6076160"/>
+              <a:gd name="connsiteY3" fmla="*/ 1866628 h 2491399"/>
+              <a:gd name="connsiteX4" fmla="*/ 5210466 w 6076160"/>
+              <a:gd name="connsiteY4" fmla="*/ 1780059 h 2491399"/>
+              <a:gd name="connsiteX5" fmla="*/ 6076160 w 6076160"/>
+              <a:gd name="connsiteY5" fmla="*/ 0 h 2491399"/>
+              <a:gd name="connsiteX0" fmla="*/ 0 w 6076160"/>
+              <a:gd name="connsiteY0" fmla="*/ 1202914 h 2493437"/>
+              <a:gd name="connsiteX1" fmla="*/ 1246620 w 6076160"/>
+              <a:gd name="connsiteY1" fmla="*/ 1374840 h 2493437"/>
+              <a:gd name="connsiteX2" fmla="*/ 1529462 w 6076160"/>
+              <a:gd name="connsiteY2" fmla="*/ 2489393 h 2493437"/>
+              <a:gd name="connsiteX3" fmla="*/ 5289420 w 6076160"/>
+              <a:gd name="connsiteY3" fmla="*/ 1866628 h 2493437"/>
+              <a:gd name="connsiteX4" fmla="*/ 6076160 w 6076160"/>
+              <a:gd name="connsiteY4" fmla="*/ 0 h 2493437"/>
+              <a:gd name="connsiteX0" fmla="*/ 0 w 6076160"/>
+              <a:gd name="connsiteY0" fmla="*/ 1202914 h 2493437"/>
+              <a:gd name="connsiteX1" fmla="*/ 1246620 w 6076160"/>
+              <a:gd name="connsiteY1" fmla="*/ 1374840 h 2493437"/>
+              <a:gd name="connsiteX2" fmla="*/ 1529462 w 6076160"/>
+              <a:gd name="connsiteY2" fmla="*/ 2489393 h 2493437"/>
+              <a:gd name="connsiteX3" fmla="*/ 5289420 w 6076160"/>
+              <a:gd name="connsiteY3" fmla="*/ 1866628 h 2493437"/>
+              <a:gd name="connsiteX4" fmla="*/ 6076160 w 6076160"/>
+              <a:gd name="connsiteY4" fmla="*/ 0 h 2493437"/>
+              <a:gd name="connsiteX0" fmla="*/ 0 w 6076160"/>
+              <a:gd name="connsiteY0" fmla="*/ 1202914 h 2492978"/>
+              <a:gd name="connsiteX1" fmla="*/ 1246620 w 6076160"/>
+              <a:gd name="connsiteY1" fmla="*/ 1374840 h 2492978"/>
+              <a:gd name="connsiteX2" fmla="*/ 1529462 w 6076160"/>
+              <a:gd name="connsiteY2" fmla="*/ 2489393 h 2492978"/>
+              <a:gd name="connsiteX3" fmla="*/ 5289420 w 6076160"/>
+              <a:gd name="connsiteY3" fmla="*/ 1866628 h 2492978"/>
+              <a:gd name="connsiteX4" fmla="*/ 6076160 w 6076160"/>
+              <a:gd name="connsiteY4" fmla="*/ 0 h 2492978"/>
+              <a:gd name="connsiteX0" fmla="*/ 0 w 6076160"/>
+              <a:gd name="connsiteY0" fmla="*/ 1202914 h 2492289"/>
+              <a:gd name="connsiteX1" fmla="*/ 1246620 w 6076160"/>
+              <a:gd name="connsiteY1" fmla="*/ 1374840 h 2492289"/>
+              <a:gd name="connsiteX2" fmla="*/ 1529462 w 6076160"/>
+              <a:gd name="connsiteY2" fmla="*/ 2489393 h 2492289"/>
+              <a:gd name="connsiteX3" fmla="*/ 5289420 w 6076160"/>
+              <a:gd name="connsiteY3" fmla="*/ 1866628 h 2492289"/>
+              <a:gd name="connsiteX4" fmla="*/ 6076160 w 6076160"/>
+              <a:gd name="connsiteY4" fmla="*/ 0 h 2492289"/>
+              <a:gd name="connsiteX0" fmla="*/ 0 w 6076160"/>
+              <a:gd name="connsiteY0" fmla="*/ 1202914 h 2495663"/>
+              <a:gd name="connsiteX1" fmla="*/ 1246620 w 6076160"/>
+              <a:gd name="connsiteY1" fmla="*/ 1374840 h 2495663"/>
+              <a:gd name="connsiteX2" fmla="*/ 1529462 w 6076160"/>
+              <a:gd name="connsiteY2" fmla="*/ 2489393 h 2495663"/>
+              <a:gd name="connsiteX3" fmla="*/ 5277283 w 6076160"/>
+              <a:gd name="connsiteY3" fmla="*/ 1775817 h 2495663"/>
+              <a:gd name="connsiteX4" fmla="*/ 6076160 w 6076160"/>
+              <a:gd name="connsiteY4" fmla="*/ 0 h 2495663"/>
+              <a:gd name="connsiteX0" fmla="*/ 0 w 6076160"/>
+              <a:gd name="connsiteY0" fmla="*/ 1202914 h 2494005"/>
+              <a:gd name="connsiteX1" fmla="*/ 1246620 w 6076160"/>
+              <a:gd name="connsiteY1" fmla="*/ 1374840 h 2494005"/>
+              <a:gd name="connsiteX2" fmla="*/ 1529462 w 6076160"/>
+              <a:gd name="connsiteY2" fmla="*/ 2489393 h 2494005"/>
+              <a:gd name="connsiteX3" fmla="*/ 5279359 w 6076160"/>
+              <a:gd name="connsiteY3" fmla="*/ 1729059 h 2494005"/>
+              <a:gd name="connsiteX4" fmla="*/ 6076160 w 6076160"/>
+              <a:gd name="connsiteY4" fmla="*/ 0 h 2494005"/>
+              <a:gd name="connsiteX0" fmla="*/ 0 w 6076160"/>
+              <a:gd name="connsiteY0" fmla="*/ 1202914 h 2495505"/>
+              <a:gd name="connsiteX1" fmla="*/ 1246620 w 6076160"/>
+              <a:gd name="connsiteY1" fmla="*/ 1374840 h 2495505"/>
+              <a:gd name="connsiteX2" fmla="*/ 1529462 w 6076160"/>
+              <a:gd name="connsiteY2" fmla="*/ 2489393 h 2495505"/>
+              <a:gd name="connsiteX3" fmla="*/ 5301718 w 6076160"/>
+              <a:gd name="connsiteY3" fmla="*/ 1771758 h 2495505"/>
+              <a:gd name="connsiteX4" fmla="*/ 6076160 w 6076160"/>
+              <a:gd name="connsiteY4" fmla="*/ 0 h 2495505"/>
+              <a:gd name="connsiteX0" fmla="*/ 0 w 6076160"/>
+              <a:gd name="connsiteY0" fmla="*/ 1202914 h 2449787"/>
+              <a:gd name="connsiteX1" fmla="*/ 1246620 w 6076160"/>
+              <a:gd name="connsiteY1" fmla="*/ 1374840 h 2449787"/>
+              <a:gd name="connsiteX2" fmla="*/ 1539684 w 6076160"/>
+              <a:gd name="connsiteY2" fmla="*/ 2441281 h 2449787"/>
+              <a:gd name="connsiteX3" fmla="*/ 5301718 w 6076160"/>
+              <a:gd name="connsiteY3" fmla="*/ 1771758 h 2449787"/>
+              <a:gd name="connsiteX4" fmla="*/ 6076160 w 6076160"/>
+              <a:gd name="connsiteY4" fmla="*/ 0 h 2449787"/>
+              <a:gd name="connsiteX0" fmla="*/ 0 w 6076160"/>
+              <a:gd name="connsiteY0" fmla="*/ 1202914 h 2441305"/>
+              <a:gd name="connsiteX1" fmla="*/ 1246620 w 6076160"/>
+              <a:gd name="connsiteY1" fmla="*/ 1374840 h 2441305"/>
+              <a:gd name="connsiteX2" fmla="*/ 1539684 w 6076160"/>
+              <a:gd name="connsiteY2" fmla="*/ 2441281 h 2441305"/>
+              <a:gd name="connsiteX3" fmla="*/ 5301718 w 6076160"/>
+              <a:gd name="connsiteY3" fmla="*/ 1771758 h 2441305"/>
+              <a:gd name="connsiteX4" fmla="*/ 6076160 w 6076160"/>
+              <a:gd name="connsiteY4" fmla="*/ 0 h 2441305"/>
+              <a:gd name="connsiteX0" fmla="*/ 0 w 6076160"/>
+              <a:gd name="connsiteY0" fmla="*/ 1202914 h 2441725"/>
+              <a:gd name="connsiteX1" fmla="*/ 1246620 w 6076160"/>
+              <a:gd name="connsiteY1" fmla="*/ 1374840 h 2441725"/>
+              <a:gd name="connsiteX2" fmla="*/ 1539684 w 6076160"/>
+              <a:gd name="connsiteY2" fmla="*/ 2441281 h 2441725"/>
+              <a:gd name="connsiteX3" fmla="*/ 5301718 w 6076160"/>
+              <a:gd name="connsiteY3" fmla="*/ 1771758 h 2441725"/>
+              <a:gd name="connsiteX4" fmla="*/ 6076160 w 6076160"/>
+              <a:gd name="connsiteY4" fmla="*/ 0 h 2441725"/>
+              <a:gd name="connsiteX0" fmla="*/ 0 w 6076160"/>
+              <a:gd name="connsiteY0" fmla="*/ 1202914 h 2479388"/>
+              <a:gd name="connsiteX1" fmla="*/ 1246620 w 6076160"/>
+              <a:gd name="connsiteY1" fmla="*/ 1374840 h 2479388"/>
+              <a:gd name="connsiteX2" fmla="*/ 1536394 w 6076160"/>
+              <a:gd name="connsiteY2" fmla="*/ 2478959 h 2479388"/>
+              <a:gd name="connsiteX3" fmla="*/ 5301718 w 6076160"/>
+              <a:gd name="connsiteY3" fmla="*/ 1771758 h 2479388"/>
+              <a:gd name="connsiteX4" fmla="*/ 6076160 w 6076160"/>
+              <a:gd name="connsiteY4" fmla="*/ 0 h 2479388"/>
+              <a:gd name="connsiteX0" fmla="*/ 0 w 6076160"/>
+              <a:gd name="connsiteY0" fmla="*/ 1202914 h 2480433"/>
+              <a:gd name="connsiteX1" fmla="*/ 1246620 w 6076160"/>
+              <a:gd name="connsiteY1" fmla="*/ 1374840 h 2480433"/>
+              <a:gd name="connsiteX2" fmla="*/ 1536394 w 6076160"/>
+              <a:gd name="connsiteY2" fmla="*/ 2478959 h 2480433"/>
+              <a:gd name="connsiteX3" fmla="*/ 5301718 w 6076160"/>
+              <a:gd name="connsiteY3" fmla="*/ 1771758 h 2480433"/>
+              <a:gd name="connsiteX4" fmla="*/ 6076160 w 6076160"/>
+              <a:gd name="connsiteY4" fmla="*/ 0 h 2480433"/>
+              <a:gd name="connsiteX0" fmla="*/ 0 w 6076160"/>
+              <a:gd name="connsiteY0" fmla="*/ 1202914 h 2480433"/>
+              <a:gd name="connsiteX1" fmla="*/ 1246620 w 6076160"/>
+              <a:gd name="connsiteY1" fmla="*/ 1374840 h 2480433"/>
+              <a:gd name="connsiteX2" fmla="*/ 1536394 w 6076160"/>
+              <a:gd name="connsiteY2" fmla="*/ 2478959 h 2480433"/>
+              <a:gd name="connsiteX3" fmla="*/ 5301718 w 6076160"/>
+              <a:gd name="connsiteY3" fmla="*/ 1771758 h 2480433"/>
+              <a:gd name="connsiteX4" fmla="*/ 6076160 w 6076160"/>
+              <a:gd name="connsiteY4" fmla="*/ 0 h 2480433"/>
+              <a:gd name="connsiteX0" fmla="*/ 0 w 6076160"/>
+              <a:gd name="connsiteY0" fmla="*/ 1202914 h 2487778"/>
+              <a:gd name="connsiteX1" fmla="*/ 1246620 w 6076160"/>
+              <a:gd name="connsiteY1" fmla="*/ 1374840 h 2487778"/>
+              <a:gd name="connsiteX2" fmla="*/ 1536394 w 6076160"/>
+              <a:gd name="connsiteY2" fmla="*/ 2478959 h 2487778"/>
+              <a:gd name="connsiteX3" fmla="*/ 5318360 w 6076160"/>
+              <a:gd name="connsiteY3" fmla="*/ 1833973 h 2487778"/>
+              <a:gd name="connsiteX4" fmla="*/ 6076160 w 6076160"/>
+              <a:gd name="connsiteY4" fmla="*/ 0 h 2487778"/>
+              <a:gd name="connsiteX0" fmla="*/ 0 w 6076160"/>
+              <a:gd name="connsiteY0" fmla="*/ 1202914 h 2485695"/>
+              <a:gd name="connsiteX1" fmla="*/ 1246620 w 6076160"/>
+              <a:gd name="connsiteY1" fmla="*/ 1374840 h 2485695"/>
+              <a:gd name="connsiteX2" fmla="*/ 1536394 w 6076160"/>
+              <a:gd name="connsiteY2" fmla="*/ 2478959 h 2485695"/>
+              <a:gd name="connsiteX3" fmla="*/ 5312291 w 6076160"/>
+              <a:gd name="connsiteY3" fmla="*/ 1788568 h 2485695"/>
+              <a:gd name="connsiteX4" fmla="*/ 6076160 w 6076160"/>
+              <a:gd name="connsiteY4" fmla="*/ 0 h 2485695"/>
+              <a:gd name="connsiteX0" fmla="*/ 0 w 6076160"/>
+              <a:gd name="connsiteY0" fmla="*/ 1202914 h 2484356"/>
+              <a:gd name="connsiteX1" fmla="*/ 1246620 w 6076160"/>
+              <a:gd name="connsiteY1" fmla="*/ 1374840 h 2484356"/>
+              <a:gd name="connsiteX2" fmla="*/ 1536394 w 6076160"/>
+              <a:gd name="connsiteY2" fmla="*/ 2478959 h 2484356"/>
+              <a:gd name="connsiteX3" fmla="*/ 5299291 w 6076160"/>
+              <a:gd name="connsiteY3" fmla="*/ 1753597 h 2484356"/>
+              <a:gd name="connsiteX4" fmla="*/ 6076160 w 6076160"/>
+              <a:gd name="connsiteY4" fmla="*/ 0 h 2484356"/>
+              <a:gd name="connsiteX0" fmla="*/ 0 w 6076160"/>
+              <a:gd name="connsiteY0" fmla="*/ 1202914 h 2470865"/>
+              <a:gd name="connsiteX1" fmla="*/ 1246620 w 6076160"/>
+              <a:gd name="connsiteY1" fmla="*/ 1374840 h 2470865"/>
+              <a:gd name="connsiteX2" fmla="*/ 1684221 w 6076160"/>
+              <a:gd name="connsiteY2" fmla="*/ 2463683 h 2470865"/>
+              <a:gd name="connsiteX3" fmla="*/ 5299291 w 6076160"/>
+              <a:gd name="connsiteY3" fmla="*/ 1753597 h 2470865"/>
+              <a:gd name="connsiteX4" fmla="*/ 6076160 w 6076160"/>
+              <a:gd name="connsiteY4" fmla="*/ 0 h 2470865"/>
+              <a:gd name="connsiteX0" fmla="*/ 0 w 6076160"/>
+              <a:gd name="connsiteY0" fmla="*/ 1202914 h 2467046"/>
+              <a:gd name="connsiteX1" fmla="*/ 1246620 w 6076160"/>
+              <a:gd name="connsiteY1" fmla="*/ 1374840 h 2467046"/>
+              <a:gd name="connsiteX2" fmla="*/ 1684221 w 6076160"/>
+              <a:gd name="connsiteY2" fmla="*/ 2463683 h 2467046"/>
+              <a:gd name="connsiteX3" fmla="*/ 5299291 w 6076160"/>
+              <a:gd name="connsiteY3" fmla="*/ 1753597 h 2467046"/>
+              <a:gd name="connsiteX4" fmla="*/ 6076160 w 6076160"/>
+              <a:gd name="connsiteY4" fmla="*/ 0 h 2467046"/>
+              <a:gd name="connsiteX0" fmla="*/ 0 w 6076160"/>
+              <a:gd name="connsiteY0" fmla="*/ 1202914 h 2471054"/>
+              <a:gd name="connsiteX1" fmla="*/ 1246620 w 6076160"/>
+              <a:gd name="connsiteY1" fmla="*/ 1374840 h 2471054"/>
+              <a:gd name="connsiteX2" fmla="*/ 1684221 w 6076160"/>
+              <a:gd name="connsiteY2" fmla="*/ 2463683 h 2471054"/>
+              <a:gd name="connsiteX3" fmla="*/ 5299291 w 6076160"/>
+              <a:gd name="connsiteY3" fmla="*/ 1753597 h 2471054"/>
+              <a:gd name="connsiteX4" fmla="*/ 6076160 w 6076160"/>
+              <a:gd name="connsiteY4" fmla="*/ 0 h 2471054"/>
+              <a:gd name="connsiteX0" fmla="*/ 0 w 6076160"/>
+              <a:gd name="connsiteY0" fmla="*/ 1202914 h 2471054"/>
+              <a:gd name="connsiteX1" fmla="*/ 1246620 w 6076160"/>
+              <a:gd name="connsiteY1" fmla="*/ 1374840 h 2471054"/>
+              <a:gd name="connsiteX2" fmla="*/ 1684221 w 6076160"/>
+              <a:gd name="connsiteY2" fmla="*/ 2463683 h 2471054"/>
+              <a:gd name="connsiteX3" fmla="*/ 5299291 w 6076160"/>
+              <a:gd name="connsiteY3" fmla="*/ 1753597 h 2471054"/>
+              <a:gd name="connsiteX4" fmla="*/ 6076160 w 6076160"/>
+              <a:gd name="connsiteY4" fmla="*/ 0 h 2471054"/>
+              <a:gd name="connsiteX0" fmla="*/ 0 w 6099220"/>
+              <a:gd name="connsiteY0" fmla="*/ 1030374 h 2471257"/>
+              <a:gd name="connsiteX1" fmla="*/ 1269680 w 6099220"/>
+              <a:gd name="connsiteY1" fmla="*/ 1374840 h 2471257"/>
+              <a:gd name="connsiteX2" fmla="*/ 1707281 w 6099220"/>
+              <a:gd name="connsiteY2" fmla="*/ 2463683 h 2471257"/>
+              <a:gd name="connsiteX3" fmla="*/ 5322351 w 6099220"/>
+              <a:gd name="connsiteY3" fmla="*/ 1753597 h 2471257"/>
+              <a:gd name="connsiteX4" fmla="*/ 6099220 w 6099220"/>
+              <a:gd name="connsiteY4" fmla="*/ 0 h 2471257"/>
+              <a:gd name="connsiteX0" fmla="*/ 0 w 6099220"/>
+              <a:gd name="connsiteY0" fmla="*/ 1030374 h 2471257"/>
+              <a:gd name="connsiteX1" fmla="*/ 1269680 w 6099220"/>
+              <a:gd name="connsiteY1" fmla="*/ 1374840 h 2471257"/>
+              <a:gd name="connsiteX2" fmla="*/ 1707281 w 6099220"/>
+              <a:gd name="connsiteY2" fmla="*/ 2463683 h 2471257"/>
+              <a:gd name="connsiteX3" fmla="*/ 5322351 w 6099220"/>
+              <a:gd name="connsiteY3" fmla="*/ 1753597 h 2471257"/>
+              <a:gd name="connsiteX4" fmla="*/ 6099220 w 6099220"/>
+              <a:gd name="connsiteY4" fmla="*/ 0 h 2471257"/>
+              <a:gd name="connsiteX0" fmla="*/ 0 w 6099220"/>
+              <a:gd name="connsiteY0" fmla="*/ 1030374 h 2471246"/>
+              <a:gd name="connsiteX1" fmla="*/ 1269680 w 6099220"/>
+              <a:gd name="connsiteY1" fmla="*/ 1374840 h 2471246"/>
+              <a:gd name="connsiteX2" fmla="*/ 1707281 w 6099220"/>
+              <a:gd name="connsiteY2" fmla="*/ 2463683 h 2471246"/>
+              <a:gd name="connsiteX3" fmla="*/ 5322351 w 6099220"/>
+              <a:gd name="connsiteY3" fmla="*/ 1753597 h 2471246"/>
+              <a:gd name="connsiteX4" fmla="*/ 6099220 w 6099220"/>
+              <a:gd name="connsiteY4" fmla="*/ 0 h 2471246"/>
+              <a:gd name="connsiteX0" fmla="*/ 0 w 6099220"/>
+              <a:gd name="connsiteY0" fmla="*/ 1030374 h 2444364"/>
+              <a:gd name="connsiteX1" fmla="*/ 1269680 w 6099220"/>
+              <a:gd name="connsiteY1" fmla="*/ 1374840 h 2444364"/>
+              <a:gd name="connsiteX2" fmla="*/ 1870185 w 6099220"/>
+              <a:gd name="connsiteY2" fmla="*/ 2436620 h 2444364"/>
+              <a:gd name="connsiteX3" fmla="*/ 5322351 w 6099220"/>
+              <a:gd name="connsiteY3" fmla="*/ 1753597 h 2444364"/>
+              <a:gd name="connsiteX4" fmla="*/ 6099220 w 6099220"/>
+              <a:gd name="connsiteY4" fmla="*/ 0 h 2444364"/>
+              <a:gd name="connsiteX0" fmla="*/ 0 w 6099220"/>
+              <a:gd name="connsiteY0" fmla="*/ 1030374 h 2445236"/>
+              <a:gd name="connsiteX1" fmla="*/ 1269680 w 6099220"/>
+              <a:gd name="connsiteY1" fmla="*/ 1374840 h 2445236"/>
+              <a:gd name="connsiteX2" fmla="*/ 1870185 w 6099220"/>
+              <a:gd name="connsiteY2" fmla="*/ 2436620 h 2445236"/>
+              <a:gd name="connsiteX3" fmla="*/ 5322351 w 6099220"/>
+              <a:gd name="connsiteY3" fmla="*/ 1753597 h 2445236"/>
+              <a:gd name="connsiteX4" fmla="*/ 6099220 w 6099220"/>
+              <a:gd name="connsiteY4" fmla="*/ 0 h 2445236"/>
+              <a:gd name="connsiteX0" fmla="*/ 0 w 6230756"/>
+              <a:gd name="connsiteY0" fmla="*/ 1042944 h 2444348"/>
+              <a:gd name="connsiteX1" fmla="*/ 1401216 w 6230756"/>
+              <a:gd name="connsiteY1" fmla="*/ 1374840 h 2444348"/>
+              <a:gd name="connsiteX2" fmla="*/ 2001721 w 6230756"/>
+              <a:gd name="connsiteY2" fmla="*/ 2436620 h 2444348"/>
+              <a:gd name="connsiteX3" fmla="*/ 5453887 w 6230756"/>
+              <a:gd name="connsiteY3" fmla="*/ 1753597 h 2444348"/>
+              <a:gd name="connsiteX4" fmla="*/ 6230756 w 6230756"/>
+              <a:gd name="connsiteY4" fmla="*/ 0 h 2444348"/>
+              <a:gd name="connsiteX0" fmla="*/ 0 w 6230756"/>
+              <a:gd name="connsiteY0" fmla="*/ 1042944 h 2445029"/>
+              <a:gd name="connsiteX1" fmla="*/ 1399652 w 6230756"/>
+              <a:gd name="connsiteY1" fmla="*/ 1300838 h 2445029"/>
+              <a:gd name="connsiteX2" fmla="*/ 2001721 w 6230756"/>
+              <a:gd name="connsiteY2" fmla="*/ 2436620 h 2445029"/>
+              <a:gd name="connsiteX3" fmla="*/ 5453887 w 6230756"/>
+              <a:gd name="connsiteY3" fmla="*/ 1753597 h 2445029"/>
+              <a:gd name="connsiteX4" fmla="*/ 6230756 w 6230756"/>
+              <a:gd name="connsiteY4" fmla="*/ 0 h 2445029"/>
             </a:gdLst>
             <a:ahLst/>
             <a:cxnLst>
@@ -11475,27 +12712,35 @@
               <a:cxn ang="0">
                 <a:pos x="connsiteX3" y="connsiteY3"/>
               </a:cxn>
+              <a:cxn ang="0">
+                <a:pos x="connsiteX4" y="connsiteY4"/>
+              </a:cxn>
             </a:cxnLst>
             <a:rect l="l" t="t" r="r" b="b"/>
             <a:pathLst>
-              <a:path w="5510401" h="2469136">
+              <a:path w="6230756" h="2445029">
                 <a:moveTo>
-                  <a:pt x="0" y="1802031"/>
+                  <a:pt x="0" y="1042944"/>
                 </a:moveTo>
                 <a:cubicBezTo>
-                  <a:pt x="684333" y="1809207"/>
-                  <a:pt x="284517" y="2483471"/>
-                  <a:pt x="1049776" y="2468904"/>
+                  <a:pt x="842185" y="917725"/>
+                  <a:pt x="1066032" y="1068559"/>
+                  <a:pt x="1399652" y="1300838"/>
                 </a:cubicBezTo>
                 <a:cubicBezTo>
-                  <a:pt x="1815035" y="2454337"/>
-                  <a:pt x="3867125" y="1990339"/>
-                  <a:pt x="4591556" y="1714627"/>
+                  <a:pt x="1733272" y="1533117"/>
+                  <a:pt x="1326015" y="2361160"/>
+                  <a:pt x="2001721" y="2436620"/>
                 </a:cubicBezTo>
                 <a:cubicBezTo>
-                  <a:pt x="5315987" y="1438915"/>
-                  <a:pt x="5386612" y="488083"/>
-                  <a:pt x="5510401" y="0"/>
+                  <a:pt x="2677427" y="2512080"/>
+                  <a:pt x="4883236" y="2063145"/>
+                  <a:pt x="5453887" y="1753597"/>
+                </a:cubicBezTo>
+                <a:cubicBezTo>
+                  <a:pt x="6024538" y="1444049"/>
+                  <a:pt x="6066852" y="388881"/>
+                  <a:pt x="6230756" y="0"/>
                 </a:cubicBezTo>
               </a:path>
             </a:pathLst>
@@ -11536,15 +12781,13 @@
       <p:cxnSp>
         <p:nvCxnSpPr>
           <p:cNvPr id="100" name="Connecteur droit avec flèche 99"/>
-          <p:cNvCxnSpPr>
-            <a:endCxn id="13" idx="1"/>
-          </p:cNvCxnSpPr>
+          <p:cNvCxnSpPr/>
           <p:nvPr/>
         </p:nvCxnSpPr>
         <p:spPr>
-          <a:xfrm flipV="1">
-            <a:off x="6330515" y="4114253"/>
-            <a:ext cx="1411731" cy="22144"/>
+          <a:xfrm>
+            <a:off x="6415527" y="3908748"/>
+            <a:ext cx="1411731" cy="0"/>
           </a:xfrm>
           <a:prstGeom prst="straightConnector1">
             <a:avLst/>
@@ -11578,9 +12821,9 @@
           <p:nvPr/>
         </p:nvCxnSpPr>
         <p:spPr>
-          <a:xfrm flipH="1" flipV="1">
-            <a:off x="6446814" y="14005668"/>
-            <a:ext cx="1295432" cy="35712"/>
+          <a:xfrm flipH="1">
+            <a:off x="7121393" y="12834908"/>
+            <a:ext cx="803537" cy="0"/>
           </a:xfrm>
           <a:prstGeom prst="straightConnector1">
             <a:avLst/>
@@ -11612,14 +12855,13 @@
           <p:cNvPr id="109" name="Connecteur droit avec flèche 108"/>
           <p:cNvCxnSpPr>
             <a:stCxn id="13" idx="2"/>
-            <a:endCxn id="11" idx="0"/>
           </p:cNvCxnSpPr>
           <p:nvPr/>
         </p:nvCxnSpPr>
         <p:spPr>
           <a:xfrm>
-            <a:off x="10597444" y="6919964"/>
-            <a:ext cx="25836" cy="1616501"/>
+            <a:off x="10682456" y="6919964"/>
+            <a:ext cx="0" cy="1431626"/>
           </a:xfrm>
           <a:prstGeom prst="straightConnector1">
             <a:avLst/>
@@ -11654,8 +12896,8 @@
         </p:nvCxnSpPr>
         <p:spPr>
           <a:xfrm>
-            <a:off x="4720125" y="11613192"/>
-            <a:ext cx="543512" cy="1636184"/>
+            <a:off x="4628694" y="10776017"/>
+            <a:ext cx="282859" cy="721843"/>
           </a:xfrm>
           <a:prstGeom prst="straightConnector1">
             <a:avLst/>
@@ -11690,8 +12932,8 @@
         </p:nvCxnSpPr>
         <p:spPr>
           <a:xfrm>
-            <a:off x="13010636" y="9467491"/>
-            <a:ext cx="1607604" cy="491944"/>
+            <a:off x="13028473" y="9325148"/>
+            <a:ext cx="1589767" cy="634287"/>
           </a:xfrm>
           <a:prstGeom prst="straightConnector1">
             <a:avLst/>
@@ -11729,7 +12971,7 @@
         <p:spPr>
           <a:xfrm>
             <a:off x="5103919" y="10113002"/>
-            <a:ext cx="2685790" cy="580298"/>
+            <a:ext cx="2814393" cy="636386"/>
           </a:xfrm>
           <a:prstGeom prst="straightConnector1">
             <a:avLst/>
@@ -11765,8 +13007,8 @@
         </p:nvSpPr>
         <p:spPr>
           <a:xfrm rot="508523">
-            <a:off x="12716107" y="3577563"/>
-            <a:ext cx="2045770" cy="2410323"/>
+            <a:off x="12864858" y="3528438"/>
+            <a:ext cx="1900649" cy="2470586"/>
           </a:xfrm>
           <a:custGeom>
             <a:avLst/>
@@ -12353,6 +13595,36 @@
               <a:gd name="connsiteY1" fmla="*/ 554696 h 1020242"/>
               <a:gd name="connsiteX2" fmla="*/ 865934 w 865934"/>
               <a:gd name="connsiteY2" fmla="*/ 1017807 h 1020242"/>
+              <a:gd name="connsiteX0" fmla="*/ 0 w 804507"/>
+              <a:gd name="connsiteY0" fmla="*/ 0 h 1045701"/>
+              <a:gd name="connsiteX1" fmla="*/ 330709 w 804507"/>
+              <a:gd name="connsiteY1" fmla="*/ 580155 h 1045701"/>
+              <a:gd name="connsiteX2" fmla="*/ 804507 w 804507"/>
+              <a:gd name="connsiteY2" fmla="*/ 1043266 h 1045701"/>
+              <a:gd name="connsiteX0" fmla="*/ 0 w 804507"/>
+              <a:gd name="connsiteY0" fmla="*/ 0 h 1045701"/>
+              <a:gd name="connsiteX1" fmla="*/ 330709 w 804507"/>
+              <a:gd name="connsiteY1" fmla="*/ 580155 h 1045701"/>
+              <a:gd name="connsiteX2" fmla="*/ 804507 w 804507"/>
+              <a:gd name="connsiteY2" fmla="*/ 1043266 h 1045701"/>
+              <a:gd name="connsiteX0" fmla="*/ 0 w 804507"/>
+              <a:gd name="connsiteY0" fmla="*/ 0 h 1045701"/>
+              <a:gd name="connsiteX1" fmla="*/ 330709 w 804507"/>
+              <a:gd name="connsiteY1" fmla="*/ 580155 h 1045701"/>
+              <a:gd name="connsiteX2" fmla="*/ 804507 w 804507"/>
+              <a:gd name="connsiteY2" fmla="*/ 1043266 h 1045701"/>
+              <a:gd name="connsiteX0" fmla="*/ 0 w 804507"/>
+              <a:gd name="connsiteY0" fmla="*/ 0 h 1045701"/>
+              <a:gd name="connsiteX1" fmla="*/ 330709 w 804507"/>
+              <a:gd name="connsiteY1" fmla="*/ 580155 h 1045701"/>
+              <a:gd name="connsiteX2" fmla="*/ 804507 w 804507"/>
+              <a:gd name="connsiteY2" fmla="*/ 1043266 h 1045701"/>
+              <a:gd name="connsiteX0" fmla="*/ 0 w 804507"/>
+              <a:gd name="connsiteY0" fmla="*/ 0 h 1045750"/>
+              <a:gd name="connsiteX1" fmla="*/ 330709 w 804507"/>
+              <a:gd name="connsiteY1" fmla="*/ 580155 h 1045750"/>
+              <a:gd name="connsiteX2" fmla="*/ 804507 w 804507"/>
+              <a:gd name="connsiteY2" fmla="*/ 1043266 h 1045750"/>
             </a:gdLst>
             <a:ahLst/>
             <a:cxnLst>
@@ -12368,19 +13640,19 @@
             </a:cxnLst>
             <a:rect l="l" t="t" r="r" b="b"/>
             <a:pathLst>
-              <a:path w="865934" h="1020242">
+              <a:path w="804507" h="1045750">
                 <a:moveTo>
                   <a:pt x="0" y="0"/>
                 </a:moveTo>
                 <a:cubicBezTo>
                   <a:pt x="188345" y="64568"/>
-                  <a:pt x="247814" y="385062"/>
-                  <a:pt x="392136" y="554696"/>
+                  <a:pt x="234240" y="403390"/>
+                  <a:pt x="330709" y="580155"/>
                 </a:cubicBezTo>
                 <a:cubicBezTo>
-                  <a:pt x="536458" y="724330"/>
-                  <a:pt x="639983" y="1051653"/>
-                  <a:pt x="865934" y="1017807"/>
+                  <a:pt x="427178" y="756920"/>
+                  <a:pt x="578556" y="1077112"/>
+                  <a:pt x="804507" y="1043266"/>
                 </a:cubicBezTo>
               </a:path>
             </a:pathLst>
@@ -12423,8 +13695,8 @@
         </p:nvSpPr>
         <p:spPr>
           <a:xfrm rot="508523">
-            <a:off x="12498191" y="4579371"/>
-            <a:ext cx="2228863" cy="1730152"/>
+            <a:off x="12650088" y="4568166"/>
+            <a:ext cx="2078127" cy="1748151"/>
           </a:xfrm>
           <a:custGeom>
             <a:avLst/>
@@ -13029,6 +14301,48 @@
               <a:gd name="connsiteY1" fmla="*/ 523718 h 732339"/>
               <a:gd name="connsiteX2" fmla="*/ 943434 w 943434"/>
               <a:gd name="connsiteY2" fmla="*/ 726355 h 732339"/>
+              <a:gd name="connsiteX0" fmla="*/ 0 w 943434"/>
+              <a:gd name="connsiteY0" fmla="*/ 0 h 730111"/>
+              <a:gd name="connsiteX1" fmla="*/ 447871 w 943434"/>
+              <a:gd name="connsiteY1" fmla="*/ 436333 h 730111"/>
+              <a:gd name="connsiteX2" fmla="*/ 943434 w 943434"/>
+              <a:gd name="connsiteY2" fmla="*/ 726355 h 730111"/>
+              <a:gd name="connsiteX0" fmla="*/ 0 w 943434"/>
+              <a:gd name="connsiteY0" fmla="*/ 0 h 730936"/>
+              <a:gd name="connsiteX1" fmla="*/ 447871 w 943434"/>
+              <a:gd name="connsiteY1" fmla="*/ 436333 h 730936"/>
+              <a:gd name="connsiteX2" fmla="*/ 943434 w 943434"/>
+              <a:gd name="connsiteY2" fmla="*/ 726355 h 730936"/>
+              <a:gd name="connsiteX0" fmla="*/ 0 w 943434"/>
+              <a:gd name="connsiteY0" fmla="*/ 0 h 730936"/>
+              <a:gd name="connsiteX1" fmla="*/ 447871 w 943434"/>
+              <a:gd name="connsiteY1" fmla="*/ 436333 h 730936"/>
+              <a:gd name="connsiteX2" fmla="*/ 943434 w 943434"/>
+              <a:gd name="connsiteY2" fmla="*/ 726355 h 730936"/>
+              <a:gd name="connsiteX0" fmla="*/ 0 w 911532"/>
+              <a:gd name="connsiteY0" fmla="*/ 0 h 734876"/>
+              <a:gd name="connsiteX1" fmla="*/ 415969 w 911532"/>
+              <a:gd name="connsiteY1" fmla="*/ 441086 h 734876"/>
+              <a:gd name="connsiteX2" fmla="*/ 911532 w 911532"/>
+              <a:gd name="connsiteY2" fmla="*/ 731108 h 734876"/>
+              <a:gd name="connsiteX0" fmla="*/ 0 w 911532"/>
+              <a:gd name="connsiteY0" fmla="*/ 0 h 735234"/>
+              <a:gd name="connsiteX1" fmla="*/ 415969 w 911532"/>
+              <a:gd name="connsiteY1" fmla="*/ 441086 h 735234"/>
+              <a:gd name="connsiteX2" fmla="*/ 911532 w 911532"/>
+              <a:gd name="connsiteY2" fmla="*/ 731108 h 735234"/>
+              <a:gd name="connsiteX0" fmla="*/ 0 w 879630"/>
+              <a:gd name="connsiteY0" fmla="*/ 0 h 739643"/>
+              <a:gd name="connsiteX1" fmla="*/ 384067 w 879630"/>
+              <a:gd name="connsiteY1" fmla="*/ 445840 h 739643"/>
+              <a:gd name="connsiteX2" fmla="*/ 879630 w 879630"/>
+              <a:gd name="connsiteY2" fmla="*/ 735862 h 739643"/>
+              <a:gd name="connsiteX0" fmla="*/ 0 w 879630"/>
+              <a:gd name="connsiteY0" fmla="*/ 0 h 739958"/>
+              <a:gd name="connsiteX1" fmla="*/ 384067 w 879630"/>
+              <a:gd name="connsiteY1" fmla="*/ 445840 h 739958"/>
+              <a:gd name="connsiteX2" fmla="*/ 879630 w 879630"/>
+              <a:gd name="connsiteY2" fmla="*/ 735862 h 739958"/>
             </a:gdLst>
             <a:ahLst/>
             <a:cxnLst>
@@ -13044,19 +14358,19 @@
             </a:cxnLst>
             <a:rect l="l" t="t" r="r" b="b"/>
             <a:pathLst>
-              <a:path w="943434" h="732339">
+              <a:path w="879630" h="739958">
                 <a:moveTo>
                   <a:pt x="0" y="0"/>
                 </a:moveTo>
                 <a:cubicBezTo>
                   <a:pt x="188345" y="64568"/>
-                  <a:pt x="360721" y="402659"/>
-                  <a:pt x="517960" y="523718"/>
+                  <a:pt x="251036" y="304869"/>
+                  <a:pt x="384067" y="445840"/>
                 </a:cubicBezTo>
                 <a:cubicBezTo>
-                  <a:pt x="675199" y="644777"/>
-                  <a:pt x="717483" y="760201"/>
-                  <a:pt x="943434" y="726355"/>
+                  <a:pt x="517098" y="586811"/>
+                  <a:pt x="653679" y="769708"/>
+                  <a:pt x="879630" y="735862"/>
                 </a:cubicBezTo>
               </a:path>
             </a:pathLst>
@@ -13099,8 +14413,8 @@
         </p:nvCxnSpPr>
         <p:spPr>
           <a:xfrm>
-            <a:off x="13249622" y="2357175"/>
-            <a:ext cx="1379844" cy="1779222"/>
+            <a:off x="13028473" y="2357175"/>
+            <a:ext cx="1600993" cy="1779222"/>
           </a:xfrm>
           <a:prstGeom prst="straightConnector1">
             <a:avLst/>

</xml_diff>